<commit_message>
commit 1 - update png doc and ppt
</commit_message>
<xml_diff>
--- a/jinlu/EC.pptx
+++ b/jinlu/EC.pptx
@@ -7,11 +7,27 @@
   <p:sldIdLst>
     <p:sldId id="256" r:id="rId2"/>
     <p:sldId id="257" r:id="rId3"/>
-    <p:sldId id="258" r:id="rId4"/>
-    <p:sldId id="260" r:id="rId5"/>
-    <p:sldId id="261" r:id="rId6"/>
-    <p:sldId id="262" r:id="rId7"/>
-    <p:sldId id="259" r:id="rId8"/>
+    <p:sldId id="263" r:id="rId4"/>
+    <p:sldId id="264" r:id="rId5"/>
+    <p:sldId id="265" r:id="rId6"/>
+    <p:sldId id="266" r:id="rId7"/>
+    <p:sldId id="267" r:id="rId8"/>
+    <p:sldId id="268" r:id="rId9"/>
+    <p:sldId id="269" r:id="rId10"/>
+    <p:sldId id="270" r:id="rId11"/>
+    <p:sldId id="271" r:id="rId12"/>
+    <p:sldId id="272" r:id="rId13"/>
+    <p:sldId id="273" r:id="rId14"/>
+    <p:sldId id="274" r:id="rId15"/>
+    <p:sldId id="275" r:id="rId16"/>
+    <p:sldId id="258" r:id="rId17"/>
+    <p:sldId id="260" r:id="rId18"/>
+    <p:sldId id="261" r:id="rId19"/>
+    <p:sldId id="262" r:id="rId20"/>
+    <p:sldId id="259" r:id="rId21"/>
+    <p:sldId id="277" r:id="rId22"/>
+    <p:sldId id="276" r:id="rId23"/>
+    <p:sldId id="278" r:id="rId24"/>
   </p:sldIdLst>
   <p:sldSz cx="12192000" cy="6858000"/>
   <p:notesSz cx="6858000" cy="9144000"/>
@@ -121,6 +137,19 @@
         <p14:section name="Bayesian" id="{B81238ED-F85E-47EB-B09D-64B728292180}">
           <p14:sldIdLst>
             <p14:sldId id="257"/>
+            <p14:sldId id="263"/>
+            <p14:sldId id="264"/>
+            <p14:sldId id="265"/>
+            <p14:sldId id="266"/>
+            <p14:sldId id="267"/>
+            <p14:sldId id="268"/>
+            <p14:sldId id="269"/>
+            <p14:sldId id="270"/>
+            <p14:sldId id="271"/>
+            <p14:sldId id="272"/>
+            <p14:sldId id="273"/>
+            <p14:sldId id="274"/>
+            <p14:sldId id="275"/>
           </p14:sldIdLst>
         </p14:section>
         <p14:section name="k-means" id="{7C08430C-37A2-4C0E-A0E7-2D3A59FB3DD6}">
@@ -136,7 +165,17 @@
             <p14:sldId id="259"/>
           </p14:sldIdLst>
         </p14:section>
+        <p14:section name="Comparison" id="{97C3BAA6-9D7B-46B7-A664-5F062B7FE80E}">
+          <p14:sldIdLst>
+            <p14:sldId id="277"/>
+            <p14:sldId id="276"/>
+            <p14:sldId id="278"/>
+          </p14:sldIdLst>
+        </p14:section>
       </p14:sectionLst>
+    </p:ext>
+    <p:ext uri="{EFAFB233-063F-42B5-8137-9DF3F51BA10A}">
+      <p15:sldGuideLst xmlns:p15="http://schemas.microsoft.com/office/powerpoint/2012/main"/>
     </p:ext>
   </p:extLst>
 </p:presentation>
@@ -147,7 +186,7 @@
   <pc:docChgLst>
     <pc:chgData name="Jinlu Liu" userId="78a8ae01-c209-4833-a803-14efb296c1fa" providerId="ADAL" clId="{EF5F709C-8B25-4768-9E74-67C0B85FC474}"/>
     <pc:docChg chg="undo custSel addSld modSld addSection modSection">
-      <pc:chgData name="Jinlu Liu" userId="78a8ae01-c209-4833-a803-14efb296c1fa" providerId="ADAL" clId="{EF5F709C-8B25-4768-9E74-67C0B85FC474}" dt="2024-03-14T15:32:20.601" v="117" actId="1076"/>
+      <pc:chgData name="Jinlu Liu" userId="78a8ae01-c209-4833-a803-14efb296c1fa" providerId="ADAL" clId="{EF5F709C-8B25-4768-9E74-67C0B85FC474}" dt="2024-03-21T12:15:11.940" v="2615" actId="20577"/>
       <pc:docMkLst>
         <pc:docMk/>
       </pc:docMkLst>
@@ -166,19 +205,59 @@
           </ac:spMkLst>
         </pc:spChg>
       </pc:sldChg>
-      <pc:sldChg chg="new">
-        <pc:chgData name="Jinlu Liu" userId="78a8ae01-c209-4833-a803-14efb296c1fa" providerId="ADAL" clId="{EF5F709C-8B25-4768-9E74-67C0B85FC474}" dt="2024-03-14T14:39:13.239" v="15" actId="680"/>
+      <pc:sldChg chg="addSp delSp modSp new mod">
+        <pc:chgData name="Jinlu Liu" userId="78a8ae01-c209-4833-a803-14efb296c1fa" providerId="ADAL" clId="{EF5F709C-8B25-4768-9E74-67C0B85FC474}" dt="2024-03-19T16:51:11.652" v="376" actId="1076"/>
         <pc:sldMkLst>
           <pc:docMk/>
           <pc:sldMk cId="3127050744" sldId="257"/>
         </pc:sldMkLst>
+        <pc:spChg chg="del">
+          <ac:chgData name="Jinlu Liu" userId="78a8ae01-c209-4833-a803-14efb296c1fa" providerId="ADAL" clId="{EF5F709C-8B25-4768-9E74-67C0B85FC474}" dt="2024-03-19T16:45:46.091" v="118" actId="478"/>
+          <ac:spMkLst>
+            <pc:docMk/>
+            <pc:sldMk cId="3127050744" sldId="257"/>
+            <ac:spMk id="2" creationId="{D7FEA48D-900B-4346-991E-8A6261C49B87}"/>
+          </ac:spMkLst>
+        </pc:spChg>
+        <pc:spChg chg="del">
+          <ac:chgData name="Jinlu Liu" userId="78a8ae01-c209-4833-a803-14efb296c1fa" providerId="ADAL" clId="{EF5F709C-8B25-4768-9E74-67C0B85FC474}" dt="2024-03-19T16:45:46.091" v="118" actId="478"/>
+          <ac:spMkLst>
+            <pc:docMk/>
+            <pc:sldMk cId="3127050744" sldId="257"/>
+            <ac:spMk id="3" creationId="{7EC644D2-496F-40A8-8C09-C6C3A4190DA9}"/>
+          </ac:spMkLst>
+        </pc:spChg>
+        <pc:spChg chg="add mod">
+          <ac:chgData name="Jinlu Liu" userId="78a8ae01-c209-4833-a803-14efb296c1fa" providerId="ADAL" clId="{EF5F709C-8B25-4768-9E74-67C0B85FC474}" dt="2024-03-19T16:51:09.288" v="375" actId="255"/>
+          <ac:spMkLst>
+            <pc:docMk/>
+            <pc:sldMk cId="3127050744" sldId="257"/>
+            <ac:spMk id="4" creationId="{E99F6C7A-3764-4990-827B-B1C97673F66F}"/>
+          </ac:spMkLst>
+        </pc:spChg>
+        <pc:picChg chg="add mod">
+          <ac:chgData name="Jinlu Liu" userId="78a8ae01-c209-4833-a803-14efb296c1fa" providerId="ADAL" clId="{EF5F709C-8B25-4768-9E74-67C0B85FC474}" dt="2024-03-19T16:51:11.652" v="376" actId="1076"/>
+          <ac:picMkLst>
+            <pc:docMk/>
+            <pc:sldMk cId="3127050744" sldId="257"/>
+            <ac:picMk id="6" creationId="{78B593E9-5CAC-4E86-8545-833294C969BD}"/>
+          </ac:picMkLst>
+        </pc:picChg>
       </pc:sldChg>
       <pc:sldChg chg="addSp delSp modSp new mod">
-        <pc:chgData name="Jinlu Liu" userId="78a8ae01-c209-4833-a803-14efb296c1fa" providerId="ADAL" clId="{EF5F709C-8B25-4768-9E74-67C0B85FC474}" dt="2024-03-14T14:50:43.120" v="25" actId="1076"/>
+        <pc:chgData name="Jinlu Liu" userId="78a8ae01-c209-4833-a803-14efb296c1fa" providerId="ADAL" clId="{EF5F709C-8B25-4768-9E74-67C0B85FC474}" dt="2024-03-19T17:29:23.473" v="1950" actId="20577"/>
         <pc:sldMkLst>
           <pc:docMk/>
           <pc:sldMk cId="2631685833" sldId="258"/>
         </pc:sldMkLst>
+        <pc:spChg chg="mod">
+          <ac:chgData name="Jinlu Liu" userId="78a8ae01-c209-4833-a803-14efb296c1fa" providerId="ADAL" clId="{EF5F709C-8B25-4768-9E74-67C0B85FC474}" dt="2024-03-19T17:29:23.473" v="1950" actId="20577"/>
+          <ac:spMkLst>
+            <pc:docMk/>
+            <pc:sldMk cId="2631685833" sldId="258"/>
+            <ac:spMk id="2" creationId="{EEA191DD-A919-431C-8856-F344353F563B}"/>
+          </ac:spMkLst>
+        </pc:spChg>
         <pc:spChg chg="del">
           <ac:chgData name="Jinlu Liu" userId="78a8ae01-c209-4833-a803-14efb296c1fa" providerId="ADAL" clId="{EF5F709C-8B25-4768-9E74-67C0B85FC474}" dt="2024-03-14T14:50:40.500" v="24" actId="931"/>
           <ac:spMkLst>
@@ -196,12 +275,44 @@
           </ac:picMkLst>
         </pc:picChg>
       </pc:sldChg>
-      <pc:sldChg chg="new">
-        <pc:chgData name="Jinlu Liu" userId="78a8ae01-c209-4833-a803-14efb296c1fa" providerId="ADAL" clId="{EF5F709C-8B25-4768-9E74-67C0B85FC474}" dt="2024-03-14T14:39:39.749" v="21" actId="680"/>
+      <pc:sldChg chg="addSp delSp modSp new mod">
+        <pc:chgData name="Jinlu Liu" userId="78a8ae01-c209-4833-a803-14efb296c1fa" providerId="ADAL" clId="{EF5F709C-8B25-4768-9E74-67C0B85FC474}" dt="2024-03-20T14:41:04.539" v="2029" actId="20577"/>
         <pc:sldMkLst>
           <pc:docMk/>
           <pc:sldMk cId="2972234332" sldId="259"/>
         </pc:sldMkLst>
+        <pc:spChg chg="del">
+          <ac:chgData name="Jinlu Liu" userId="78a8ae01-c209-4833-a803-14efb296c1fa" providerId="ADAL" clId="{EF5F709C-8B25-4768-9E74-67C0B85FC474}" dt="2024-03-20T14:39:09.581" v="1951" actId="478"/>
+          <ac:spMkLst>
+            <pc:docMk/>
+            <pc:sldMk cId="2972234332" sldId="259"/>
+            <ac:spMk id="2" creationId="{B21D329F-2AD4-453C-97F6-1611C85C310A}"/>
+          </ac:spMkLst>
+        </pc:spChg>
+        <pc:spChg chg="del">
+          <ac:chgData name="Jinlu Liu" userId="78a8ae01-c209-4833-a803-14efb296c1fa" providerId="ADAL" clId="{EF5F709C-8B25-4768-9E74-67C0B85FC474}" dt="2024-03-20T14:39:09.581" v="1951" actId="478"/>
+          <ac:spMkLst>
+            <pc:docMk/>
+            <pc:sldMk cId="2972234332" sldId="259"/>
+            <ac:spMk id="3" creationId="{E5B2B806-A1B4-4755-A186-8959270A86FE}"/>
+          </ac:spMkLst>
+        </pc:spChg>
+        <pc:spChg chg="add mod">
+          <ac:chgData name="Jinlu Liu" userId="78a8ae01-c209-4833-a803-14efb296c1fa" providerId="ADAL" clId="{EF5F709C-8B25-4768-9E74-67C0B85FC474}" dt="2024-03-20T14:41:04.539" v="2029" actId="20577"/>
+          <ac:spMkLst>
+            <pc:docMk/>
+            <pc:sldMk cId="2972234332" sldId="259"/>
+            <ac:spMk id="6" creationId="{A70268C1-601B-45D7-85D9-58177148256B}"/>
+          </ac:spMkLst>
+        </pc:spChg>
+        <pc:picChg chg="add mod">
+          <ac:chgData name="Jinlu Liu" userId="78a8ae01-c209-4833-a803-14efb296c1fa" providerId="ADAL" clId="{EF5F709C-8B25-4768-9E74-67C0B85FC474}" dt="2024-03-20T14:39:30.631" v="1994" actId="1076"/>
+          <ac:picMkLst>
+            <pc:docMk/>
+            <pc:sldMk cId="2972234332" sldId="259"/>
+            <ac:picMk id="5" creationId="{5BF36865-74F3-435D-98EE-88192BEE201D}"/>
+          </ac:picMkLst>
+        </pc:picChg>
       </pc:sldChg>
       <pc:sldChg chg="addSp delSp modSp new mod">
         <pc:chgData name="Jinlu Liu" userId="78a8ae01-c209-4833-a803-14efb296c1fa" providerId="ADAL" clId="{EF5F709C-8B25-4768-9E74-67C0B85FC474}" dt="2024-03-14T14:55:25.378" v="96" actId="1076"/>
@@ -341,6 +452,598 @@
             <pc:docMk/>
             <pc:sldMk cId="2365335430" sldId="262"/>
             <ac:picMk id="6" creationId="{0B573D0A-D00A-4E08-B4E8-362794DAE860}"/>
+          </ac:picMkLst>
+        </pc:picChg>
+      </pc:sldChg>
+      <pc:sldChg chg="addSp delSp modSp new mod">
+        <pc:chgData name="Jinlu Liu" userId="78a8ae01-c209-4833-a803-14efb296c1fa" providerId="ADAL" clId="{EF5F709C-8B25-4768-9E74-67C0B85FC474}" dt="2024-03-19T16:51:01.657" v="374" actId="20577"/>
+        <pc:sldMkLst>
+          <pc:docMk/>
+          <pc:sldMk cId="635113151" sldId="263"/>
+        </pc:sldMkLst>
+        <pc:spChg chg="mod">
+          <ac:chgData name="Jinlu Liu" userId="78a8ae01-c209-4833-a803-14efb296c1fa" providerId="ADAL" clId="{EF5F709C-8B25-4768-9E74-67C0B85FC474}" dt="2024-03-19T16:51:01.657" v="374" actId="20577"/>
+          <ac:spMkLst>
+            <pc:docMk/>
+            <pc:sldMk cId="635113151" sldId="263"/>
+            <ac:spMk id="2" creationId="{FD880C78-AB8C-442F-8D57-67486738F907}"/>
+          </ac:spMkLst>
+        </pc:spChg>
+        <pc:spChg chg="del">
+          <ac:chgData name="Jinlu Liu" userId="78a8ae01-c209-4833-a803-14efb296c1fa" providerId="ADAL" clId="{EF5F709C-8B25-4768-9E74-67C0B85FC474}" dt="2024-03-19T16:46:48.773" v="127"/>
+          <ac:spMkLst>
+            <pc:docMk/>
+            <pc:sldMk cId="635113151" sldId="263"/>
+            <ac:spMk id="3" creationId="{36F261A3-2BE5-45F5-9866-09D4A5ABCC3B}"/>
+          </ac:spMkLst>
+        </pc:spChg>
+        <pc:picChg chg="add mod">
+          <ac:chgData name="Jinlu Liu" userId="78a8ae01-c209-4833-a803-14efb296c1fa" providerId="ADAL" clId="{EF5F709C-8B25-4768-9E74-67C0B85FC474}" dt="2024-03-19T16:47:16.233" v="199" actId="14100"/>
+          <ac:picMkLst>
+            <pc:docMk/>
+            <pc:sldMk cId="635113151" sldId="263"/>
+            <ac:picMk id="5" creationId="{25FFD113-E8BE-4CF3-B972-7630F4CEDD9E}"/>
+          </ac:picMkLst>
+        </pc:picChg>
+      </pc:sldChg>
+      <pc:sldChg chg="addSp delSp modSp new mod">
+        <pc:chgData name="Jinlu Liu" userId="78a8ae01-c209-4833-a803-14efb296c1fa" providerId="ADAL" clId="{EF5F709C-8B25-4768-9E74-67C0B85FC474}" dt="2024-03-19T16:50:58.553" v="372" actId="20577"/>
+        <pc:sldMkLst>
+          <pc:docMk/>
+          <pc:sldMk cId="4247004911" sldId="264"/>
+        </pc:sldMkLst>
+        <pc:spChg chg="mod">
+          <ac:chgData name="Jinlu Liu" userId="78a8ae01-c209-4833-a803-14efb296c1fa" providerId="ADAL" clId="{EF5F709C-8B25-4768-9E74-67C0B85FC474}" dt="2024-03-19T16:50:58.553" v="372" actId="20577"/>
+          <ac:spMkLst>
+            <pc:docMk/>
+            <pc:sldMk cId="4247004911" sldId="264"/>
+            <ac:spMk id="2" creationId="{4B431FC6-1982-4A14-924A-EACF64E30FA2}"/>
+          </ac:spMkLst>
+        </pc:spChg>
+        <pc:spChg chg="del">
+          <ac:chgData name="Jinlu Liu" userId="78a8ae01-c209-4833-a803-14efb296c1fa" providerId="ADAL" clId="{EF5F709C-8B25-4768-9E74-67C0B85FC474}" dt="2024-03-19T16:48:37.784" v="201" actId="478"/>
+          <ac:spMkLst>
+            <pc:docMk/>
+            <pc:sldMk cId="4247004911" sldId="264"/>
+            <ac:spMk id="3" creationId="{484237A3-E77D-4B73-B01E-74C70FB52368}"/>
+          </ac:spMkLst>
+        </pc:spChg>
+        <pc:picChg chg="add mod">
+          <ac:chgData name="Jinlu Liu" userId="78a8ae01-c209-4833-a803-14efb296c1fa" providerId="ADAL" clId="{EF5F709C-8B25-4768-9E74-67C0B85FC474}" dt="2024-03-19T16:48:40.662" v="203" actId="1076"/>
+          <ac:picMkLst>
+            <pc:docMk/>
+            <pc:sldMk cId="4247004911" sldId="264"/>
+            <ac:picMk id="5" creationId="{320BF028-A481-4CAF-A108-D1CAA34E8771}"/>
+          </ac:picMkLst>
+        </pc:picChg>
+      </pc:sldChg>
+      <pc:sldChg chg="addSp delSp modSp new mod">
+        <pc:chgData name="Jinlu Liu" userId="78a8ae01-c209-4833-a803-14efb296c1fa" providerId="ADAL" clId="{EF5F709C-8B25-4768-9E74-67C0B85FC474}" dt="2024-03-19T16:49:39.515" v="267" actId="1076"/>
+        <pc:sldMkLst>
+          <pc:docMk/>
+          <pc:sldMk cId="4292392164" sldId="265"/>
+        </pc:sldMkLst>
+        <pc:spChg chg="del">
+          <ac:chgData name="Jinlu Liu" userId="78a8ae01-c209-4833-a803-14efb296c1fa" providerId="ADAL" clId="{EF5F709C-8B25-4768-9E74-67C0B85FC474}" dt="2024-03-19T16:49:17.235" v="260" actId="478"/>
+          <ac:spMkLst>
+            <pc:docMk/>
+            <pc:sldMk cId="4292392164" sldId="265"/>
+            <ac:spMk id="2" creationId="{BFA65268-4C10-4CBD-BC7F-816527033D66}"/>
+          </ac:spMkLst>
+        </pc:spChg>
+        <pc:spChg chg="del">
+          <ac:chgData name="Jinlu Liu" userId="78a8ae01-c209-4833-a803-14efb296c1fa" providerId="ADAL" clId="{EF5F709C-8B25-4768-9E74-67C0B85FC474}" dt="2024-03-19T16:49:17.235" v="260" actId="478"/>
+          <ac:spMkLst>
+            <pc:docMk/>
+            <pc:sldMk cId="4292392164" sldId="265"/>
+            <ac:spMk id="3" creationId="{62AFB059-2EE4-4A24-AABD-175DAB398ABA}"/>
+          </ac:spMkLst>
+        </pc:spChg>
+        <pc:spChg chg="add mod">
+          <ac:chgData name="Jinlu Liu" userId="78a8ae01-c209-4833-a803-14efb296c1fa" providerId="ADAL" clId="{EF5F709C-8B25-4768-9E74-67C0B85FC474}" dt="2024-03-19T16:49:18.098" v="261"/>
+          <ac:spMkLst>
+            <pc:docMk/>
+            <pc:sldMk cId="4292392164" sldId="265"/>
+            <ac:spMk id="4" creationId="{3C8FD198-E4AA-4BF6-A7A3-03C048155661}"/>
+          </ac:spMkLst>
+        </pc:spChg>
+        <pc:picChg chg="add mod">
+          <ac:chgData name="Jinlu Liu" userId="78a8ae01-c209-4833-a803-14efb296c1fa" providerId="ADAL" clId="{EF5F709C-8B25-4768-9E74-67C0B85FC474}" dt="2024-03-19T16:49:39.515" v="267" actId="1076"/>
+          <ac:picMkLst>
+            <pc:docMk/>
+            <pc:sldMk cId="4292392164" sldId="265"/>
+            <ac:picMk id="6" creationId="{9814D9B9-52F8-425B-A6B3-321FE3E06ED1}"/>
+          </ac:picMkLst>
+        </pc:picChg>
+      </pc:sldChg>
+      <pc:sldChg chg="addSp delSp modSp new mod">
+        <pc:chgData name="Jinlu Liu" userId="78a8ae01-c209-4833-a803-14efb296c1fa" providerId="ADAL" clId="{EF5F709C-8B25-4768-9E74-67C0B85FC474}" dt="2024-03-19T16:50:50.533" v="370" actId="20577"/>
+        <pc:sldMkLst>
+          <pc:docMk/>
+          <pc:sldMk cId="2570465643" sldId="266"/>
+        </pc:sldMkLst>
+        <pc:spChg chg="del">
+          <ac:chgData name="Jinlu Liu" userId="78a8ae01-c209-4833-a803-14efb296c1fa" providerId="ADAL" clId="{EF5F709C-8B25-4768-9E74-67C0B85FC474}" dt="2024-03-19T16:49:48.146" v="269" actId="478"/>
+          <ac:spMkLst>
+            <pc:docMk/>
+            <pc:sldMk cId="2570465643" sldId="266"/>
+            <ac:spMk id="2" creationId="{E3D953B6-E70C-474C-87B3-02E52B71F6D9}"/>
+          </ac:spMkLst>
+        </pc:spChg>
+        <pc:spChg chg="del">
+          <ac:chgData name="Jinlu Liu" userId="78a8ae01-c209-4833-a803-14efb296c1fa" providerId="ADAL" clId="{EF5F709C-8B25-4768-9E74-67C0B85FC474}" dt="2024-03-19T16:49:49.442" v="270" actId="478"/>
+          <ac:spMkLst>
+            <pc:docMk/>
+            <pc:sldMk cId="2570465643" sldId="266"/>
+            <ac:spMk id="3" creationId="{5DF94556-B93D-48F9-AC5D-339AE3B3958A}"/>
+          </ac:spMkLst>
+        </pc:spChg>
+        <pc:spChg chg="add mod">
+          <ac:chgData name="Jinlu Liu" userId="78a8ae01-c209-4833-a803-14efb296c1fa" providerId="ADAL" clId="{EF5F709C-8B25-4768-9E74-67C0B85FC474}" dt="2024-03-19T16:50:50.533" v="370" actId="20577"/>
+          <ac:spMkLst>
+            <pc:docMk/>
+            <pc:sldMk cId="2570465643" sldId="266"/>
+            <ac:spMk id="6" creationId="{44769953-758F-4193-9D52-4B8866DFCF54}"/>
+          </ac:spMkLst>
+        </pc:spChg>
+        <pc:picChg chg="add mod">
+          <ac:chgData name="Jinlu Liu" userId="78a8ae01-c209-4833-a803-14efb296c1fa" providerId="ADAL" clId="{EF5F709C-8B25-4768-9E74-67C0B85FC474}" dt="2024-03-19T16:50:06.987" v="276" actId="1076"/>
+          <ac:picMkLst>
+            <pc:docMk/>
+            <pc:sldMk cId="2570465643" sldId="266"/>
+            <ac:picMk id="5" creationId="{F98380BA-4684-428D-97C7-49F7D57D557A}"/>
+          </ac:picMkLst>
+        </pc:picChg>
+      </pc:sldChg>
+      <pc:sldChg chg="addSp delSp modSp new mod">
+        <pc:chgData name="Jinlu Liu" userId="78a8ae01-c209-4833-a803-14efb296c1fa" providerId="ADAL" clId="{EF5F709C-8B25-4768-9E74-67C0B85FC474}" dt="2024-03-19T16:53:30.248" v="698" actId="20577"/>
+        <pc:sldMkLst>
+          <pc:docMk/>
+          <pc:sldMk cId="3978825970" sldId="267"/>
+        </pc:sldMkLst>
+        <pc:spChg chg="mod">
+          <ac:chgData name="Jinlu Liu" userId="78a8ae01-c209-4833-a803-14efb296c1fa" providerId="ADAL" clId="{EF5F709C-8B25-4768-9E74-67C0B85FC474}" dt="2024-03-19T16:53:30.248" v="698" actId="20577"/>
+          <ac:spMkLst>
+            <pc:docMk/>
+            <pc:sldMk cId="3978825970" sldId="267"/>
+            <ac:spMk id="2" creationId="{EC65BAF8-884C-466D-9CB6-808E88B36365}"/>
+          </ac:spMkLst>
+        </pc:spChg>
+        <pc:spChg chg="del">
+          <ac:chgData name="Jinlu Liu" userId="78a8ae01-c209-4833-a803-14efb296c1fa" providerId="ADAL" clId="{EF5F709C-8B25-4768-9E74-67C0B85FC474}" dt="2024-03-19T16:51:25.979" v="378" actId="478"/>
+          <ac:spMkLst>
+            <pc:docMk/>
+            <pc:sldMk cId="3978825970" sldId="267"/>
+            <ac:spMk id="3" creationId="{14089C9F-24DA-444F-B8C4-31CB710F99FE}"/>
+          </ac:spMkLst>
+        </pc:spChg>
+        <pc:picChg chg="add mod">
+          <ac:chgData name="Jinlu Liu" userId="78a8ae01-c209-4833-a803-14efb296c1fa" providerId="ADAL" clId="{EF5F709C-8B25-4768-9E74-67C0B85FC474}" dt="2024-03-19T16:51:58.274" v="432" actId="1076"/>
+          <ac:picMkLst>
+            <pc:docMk/>
+            <pc:sldMk cId="3978825970" sldId="267"/>
+            <ac:picMk id="5" creationId="{2DA993CA-2A38-4ACD-8147-09FDBA50662B}"/>
+          </ac:picMkLst>
+        </pc:picChg>
+        <pc:picChg chg="add mod">
+          <ac:chgData name="Jinlu Liu" userId="78a8ae01-c209-4833-a803-14efb296c1fa" providerId="ADAL" clId="{EF5F709C-8B25-4768-9E74-67C0B85FC474}" dt="2024-03-19T16:51:54.592" v="431" actId="1076"/>
+          <ac:picMkLst>
+            <pc:docMk/>
+            <pc:sldMk cId="3978825970" sldId="267"/>
+            <ac:picMk id="7" creationId="{D2C06415-075A-4BC2-8D49-9A5D4B0598AF}"/>
+          </ac:picMkLst>
+        </pc:picChg>
+      </pc:sldChg>
+      <pc:sldChg chg="addSp delSp modSp new mod">
+        <pc:chgData name="Jinlu Liu" userId="78a8ae01-c209-4833-a803-14efb296c1fa" providerId="ADAL" clId="{EF5F709C-8B25-4768-9E74-67C0B85FC474}" dt="2024-03-19T16:54:35.611" v="784" actId="1076"/>
+        <pc:sldMkLst>
+          <pc:docMk/>
+          <pc:sldMk cId="418563897" sldId="268"/>
+        </pc:sldMkLst>
+        <pc:spChg chg="mod">
+          <ac:chgData name="Jinlu Liu" userId="78a8ae01-c209-4833-a803-14efb296c1fa" providerId="ADAL" clId="{EF5F709C-8B25-4768-9E74-67C0B85FC474}" dt="2024-03-19T16:54:20.663" v="780" actId="20577"/>
+          <ac:spMkLst>
+            <pc:docMk/>
+            <pc:sldMk cId="418563897" sldId="268"/>
+            <ac:spMk id="2" creationId="{273B825D-ED3F-44F6-AD37-E3B47C0102B2}"/>
+          </ac:spMkLst>
+        </pc:spChg>
+        <pc:spChg chg="del">
+          <ac:chgData name="Jinlu Liu" userId="78a8ae01-c209-4833-a803-14efb296c1fa" providerId="ADAL" clId="{EF5F709C-8B25-4768-9E74-67C0B85FC474}" dt="2024-03-19T16:53:51.503" v="700"/>
+          <ac:spMkLst>
+            <pc:docMk/>
+            <pc:sldMk cId="418563897" sldId="268"/>
+            <ac:spMk id="3" creationId="{4EAC88DE-89E9-46BA-826A-8B98B92160F8}"/>
+          </ac:spMkLst>
+        </pc:spChg>
+        <pc:picChg chg="add mod">
+          <ac:chgData name="Jinlu Liu" userId="78a8ae01-c209-4833-a803-14efb296c1fa" providerId="ADAL" clId="{EF5F709C-8B25-4768-9E74-67C0B85FC474}" dt="2024-03-19T16:54:35.611" v="784" actId="1076"/>
+          <ac:picMkLst>
+            <pc:docMk/>
+            <pc:sldMk cId="418563897" sldId="268"/>
+            <ac:picMk id="5" creationId="{FEB170E3-0419-44B7-92CB-0891B6CCF834}"/>
+          </ac:picMkLst>
+        </pc:picChg>
+      </pc:sldChg>
+      <pc:sldChg chg="addSp delSp modSp new mod">
+        <pc:chgData name="Jinlu Liu" userId="78a8ae01-c209-4833-a803-14efb296c1fa" providerId="ADAL" clId="{EF5F709C-8B25-4768-9E74-67C0B85FC474}" dt="2024-03-19T16:58:47.490" v="790" actId="20577"/>
+        <pc:sldMkLst>
+          <pc:docMk/>
+          <pc:sldMk cId="1415361761" sldId="269"/>
+        </pc:sldMkLst>
+        <pc:spChg chg="del">
+          <ac:chgData name="Jinlu Liu" userId="78a8ae01-c209-4833-a803-14efb296c1fa" providerId="ADAL" clId="{EF5F709C-8B25-4768-9E74-67C0B85FC474}" dt="2024-03-19T16:58:22.888" v="786" actId="478"/>
+          <ac:spMkLst>
+            <pc:docMk/>
+            <pc:sldMk cId="1415361761" sldId="269"/>
+            <ac:spMk id="2" creationId="{4B2BAEE5-9738-412A-9DA6-20A3CE0CC167}"/>
+          </ac:spMkLst>
+        </pc:spChg>
+        <pc:spChg chg="del">
+          <ac:chgData name="Jinlu Liu" userId="78a8ae01-c209-4833-a803-14efb296c1fa" providerId="ADAL" clId="{EF5F709C-8B25-4768-9E74-67C0B85FC474}" dt="2024-03-19T16:58:22.888" v="786" actId="478"/>
+          <ac:spMkLst>
+            <pc:docMk/>
+            <pc:sldMk cId="1415361761" sldId="269"/>
+            <ac:spMk id="3" creationId="{B80041E2-6891-4634-9A97-D2260A85ECB1}"/>
+          </ac:spMkLst>
+        </pc:spChg>
+        <pc:spChg chg="add mod">
+          <ac:chgData name="Jinlu Liu" userId="78a8ae01-c209-4833-a803-14efb296c1fa" providerId="ADAL" clId="{EF5F709C-8B25-4768-9E74-67C0B85FC474}" dt="2024-03-19T16:58:47.490" v="790" actId="20577"/>
+          <ac:spMkLst>
+            <pc:docMk/>
+            <pc:sldMk cId="1415361761" sldId="269"/>
+            <ac:spMk id="4" creationId="{16956498-3B08-4EC6-B1FD-B38657847DE6}"/>
+          </ac:spMkLst>
+        </pc:spChg>
+        <pc:picChg chg="add mod">
+          <ac:chgData name="Jinlu Liu" userId="78a8ae01-c209-4833-a803-14efb296c1fa" providerId="ADAL" clId="{EF5F709C-8B25-4768-9E74-67C0B85FC474}" dt="2024-03-19T16:58:32.689" v="788"/>
+          <ac:picMkLst>
+            <pc:docMk/>
+            <pc:sldMk cId="1415361761" sldId="269"/>
+            <ac:picMk id="6" creationId="{66D63720-3653-421D-B4C4-685BBC5ADCC0}"/>
+          </ac:picMkLst>
+        </pc:picChg>
+      </pc:sldChg>
+      <pc:sldChg chg="addSp delSp modSp new mod">
+        <pc:chgData name="Jinlu Liu" userId="78a8ae01-c209-4833-a803-14efb296c1fa" providerId="ADAL" clId="{EF5F709C-8B25-4768-9E74-67C0B85FC474}" dt="2024-03-19T17:02:31.814" v="797"/>
+        <pc:sldMkLst>
+          <pc:docMk/>
+          <pc:sldMk cId="4177573298" sldId="270"/>
+        </pc:sldMkLst>
+        <pc:spChg chg="del">
+          <ac:chgData name="Jinlu Liu" userId="78a8ae01-c209-4833-a803-14efb296c1fa" providerId="ADAL" clId="{EF5F709C-8B25-4768-9E74-67C0B85FC474}" dt="2024-03-19T17:02:12.946" v="792" actId="478"/>
+          <ac:spMkLst>
+            <pc:docMk/>
+            <pc:sldMk cId="4177573298" sldId="270"/>
+            <ac:spMk id="2" creationId="{5A540F1E-AC7C-439B-B9B7-19EFAB88DE69}"/>
+          </ac:spMkLst>
+        </pc:spChg>
+        <pc:spChg chg="del">
+          <ac:chgData name="Jinlu Liu" userId="78a8ae01-c209-4833-a803-14efb296c1fa" providerId="ADAL" clId="{EF5F709C-8B25-4768-9E74-67C0B85FC474}" dt="2024-03-19T17:02:12.946" v="792" actId="478"/>
+          <ac:spMkLst>
+            <pc:docMk/>
+            <pc:sldMk cId="4177573298" sldId="270"/>
+            <ac:spMk id="3" creationId="{2F93234F-7B25-4DCD-8D28-30D8BA2A2EF3}"/>
+          </ac:spMkLst>
+        </pc:spChg>
+        <pc:spChg chg="add mod">
+          <ac:chgData name="Jinlu Liu" userId="78a8ae01-c209-4833-a803-14efb296c1fa" providerId="ADAL" clId="{EF5F709C-8B25-4768-9E74-67C0B85FC474}" dt="2024-03-19T17:02:23.960" v="796" actId="20577"/>
+          <ac:spMkLst>
+            <pc:docMk/>
+            <pc:sldMk cId="4177573298" sldId="270"/>
+            <ac:spMk id="5" creationId="{96F5F208-B143-4C66-82F2-5C631A05EC43}"/>
+          </ac:spMkLst>
+        </pc:spChg>
+        <pc:picChg chg="add mod">
+          <ac:chgData name="Jinlu Liu" userId="78a8ae01-c209-4833-a803-14efb296c1fa" providerId="ADAL" clId="{EF5F709C-8B25-4768-9E74-67C0B85FC474}" dt="2024-03-19T17:02:31.814" v="797"/>
+          <ac:picMkLst>
+            <pc:docMk/>
+            <pc:sldMk cId="4177573298" sldId="270"/>
+            <ac:picMk id="7" creationId="{E828E7A8-3A1F-44D0-B64B-1457346EC21D}"/>
+          </ac:picMkLst>
+        </pc:picChg>
+      </pc:sldChg>
+      <pc:sldChg chg="addSp delSp modSp new mod">
+        <pc:chgData name="Jinlu Liu" userId="78a8ae01-c209-4833-a803-14efb296c1fa" providerId="ADAL" clId="{EF5F709C-8B25-4768-9E74-67C0B85FC474}" dt="2024-03-19T17:03:45.734" v="940"/>
+        <pc:sldMkLst>
+          <pc:docMk/>
+          <pc:sldMk cId="4191853831" sldId="271"/>
+        </pc:sldMkLst>
+        <pc:spChg chg="mod">
+          <ac:chgData name="Jinlu Liu" userId="78a8ae01-c209-4833-a803-14efb296c1fa" providerId="ADAL" clId="{EF5F709C-8B25-4768-9E74-67C0B85FC474}" dt="2024-03-19T17:03:27.912" v="939" actId="14100"/>
+          <ac:spMkLst>
+            <pc:docMk/>
+            <pc:sldMk cId="4191853831" sldId="271"/>
+            <ac:spMk id="2" creationId="{260AEF4F-F353-4A12-9501-6016D8BC853D}"/>
+          </ac:spMkLst>
+        </pc:spChg>
+        <pc:spChg chg="del">
+          <ac:chgData name="Jinlu Liu" userId="78a8ae01-c209-4833-a803-14efb296c1fa" providerId="ADAL" clId="{EF5F709C-8B25-4768-9E74-67C0B85FC474}" dt="2024-03-19T17:02:52.085" v="799" actId="478"/>
+          <ac:spMkLst>
+            <pc:docMk/>
+            <pc:sldMk cId="4191853831" sldId="271"/>
+            <ac:spMk id="3" creationId="{26C046F0-D5BB-4E1A-935C-D233E3E9699E}"/>
+          </ac:spMkLst>
+        </pc:spChg>
+        <pc:picChg chg="add mod">
+          <ac:chgData name="Jinlu Liu" userId="78a8ae01-c209-4833-a803-14efb296c1fa" providerId="ADAL" clId="{EF5F709C-8B25-4768-9E74-67C0B85FC474}" dt="2024-03-19T17:03:45.734" v="940"/>
+          <ac:picMkLst>
+            <pc:docMk/>
+            <pc:sldMk cId="4191853831" sldId="271"/>
+            <ac:picMk id="5" creationId="{77BC6A5D-C037-49D5-9B6C-98AEBC0141E7}"/>
+          </ac:picMkLst>
+        </pc:picChg>
+      </pc:sldChg>
+      <pc:sldChg chg="addSp delSp modSp new mod">
+        <pc:chgData name="Jinlu Liu" userId="78a8ae01-c209-4833-a803-14efb296c1fa" providerId="ADAL" clId="{EF5F709C-8B25-4768-9E74-67C0B85FC474}" dt="2024-03-19T17:07:57.876" v="1093" actId="1076"/>
+        <pc:sldMkLst>
+          <pc:docMk/>
+          <pc:sldMk cId="203089995" sldId="272"/>
+        </pc:sldMkLst>
+        <pc:spChg chg="mod">
+          <ac:chgData name="Jinlu Liu" userId="78a8ae01-c209-4833-a803-14efb296c1fa" providerId="ADAL" clId="{EF5F709C-8B25-4768-9E74-67C0B85FC474}" dt="2024-03-19T17:07:56.930" v="1092" actId="14100"/>
+          <ac:spMkLst>
+            <pc:docMk/>
+            <pc:sldMk cId="203089995" sldId="272"/>
+            <ac:spMk id="2" creationId="{E2A79BAC-4DC5-461E-A69F-0C5B0805BF6D}"/>
+          </ac:spMkLst>
+        </pc:spChg>
+        <pc:spChg chg="del">
+          <ac:chgData name="Jinlu Liu" userId="78a8ae01-c209-4833-a803-14efb296c1fa" providerId="ADAL" clId="{EF5F709C-8B25-4768-9E74-67C0B85FC474}" dt="2024-03-19T17:06:33.401" v="942" actId="478"/>
+          <ac:spMkLst>
+            <pc:docMk/>
+            <pc:sldMk cId="203089995" sldId="272"/>
+            <ac:spMk id="3" creationId="{BABD63F7-F27B-45A6-A665-D7BACBB290BB}"/>
+          </ac:spMkLst>
+        </pc:spChg>
+        <pc:picChg chg="add mod">
+          <ac:chgData name="Jinlu Liu" userId="78a8ae01-c209-4833-a803-14efb296c1fa" providerId="ADAL" clId="{EF5F709C-8B25-4768-9E74-67C0B85FC474}" dt="2024-03-19T17:07:57.876" v="1093" actId="1076"/>
+          <ac:picMkLst>
+            <pc:docMk/>
+            <pc:sldMk cId="203089995" sldId="272"/>
+            <ac:picMk id="5" creationId="{F0D32078-D2FC-4B62-ACB4-52E22D4D5C7C}"/>
+          </ac:picMkLst>
+        </pc:picChg>
+      </pc:sldChg>
+      <pc:sldChg chg="addSp delSp modSp new mod">
+        <pc:chgData name="Jinlu Liu" userId="78a8ae01-c209-4833-a803-14efb296c1fa" providerId="ADAL" clId="{EF5F709C-8B25-4768-9E74-67C0B85FC474}" dt="2024-03-19T17:27:31.319" v="1517" actId="20577"/>
+        <pc:sldMkLst>
+          <pc:docMk/>
+          <pc:sldMk cId="577294232" sldId="273"/>
+        </pc:sldMkLst>
+        <pc:spChg chg="mod">
+          <ac:chgData name="Jinlu Liu" userId="78a8ae01-c209-4833-a803-14efb296c1fa" providerId="ADAL" clId="{EF5F709C-8B25-4768-9E74-67C0B85FC474}" dt="2024-03-19T17:27:31.319" v="1517" actId="20577"/>
+          <ac:spMkLst>
+            <pc:docMk/>
+            <pc:sldMk cId="577294232" sldId="273"/>
+            <ac:spMk id="2" creationId="{BD29CE6C-0DB2-4143-AB0A-2E6158AC647B}"/>
+          </ac:spMkLst>
+        </pc:spChg>
+        <pc:spChg chg="del">
+          <ac:chgData name="Jinlu Liu" userId="78a8ae01-c209-4833-a803-14efb296c1fa" providerId="ADAL" clId="{EF5F709C-8B25-4768-9E74-67C0B85FC474}" dt="2024-03-19T17:24:30.723" v="1095" actId="478"/>
+          <ac:spMkLst>
+            <pc:docMk/>
+            <pc:sldMk cId="577294232" sldId="273"/>
+            <ac:spMk id="3" creationId="{9479E14F-C194-4919-A93E-94D61662BD07}"/>
+          </ac:spMkLst>
+        </pc:spChg>
+        <pc:picChg chg="add del mod">
+          <ac:chgData name="Jinlu Liu" userId="78a8ae01-c209-4833-a803-14efb296c1fa" providerId="ADAL" clId="{EF5F709C-8B25-4768-9E74-67C0B85FC474}" dt="2024-03-19T17:25:51.392" v="1196" actId="21"/>
+          <ac:picMkLst>
+            <pc:docMk/>
+            <pc:sldMk cId="577294232" sldId="273"/>
+            <ac:picMk id="5" creationId="{CE8976BA-9B78-4DC5-AF95-B6677DC28FB2}"/>
+          </ac:picMkLst>
+        </pc:picChg>
+        <pc:picChg chg="add mod">
+          <ac:chgData name="Jinlu Liu" userId="78a8ae01-c209-4833-a803-14efb296c1fa" providerId="ADAL" clId="{EF5F709C-8B25-4768-9E74-67C0B85FC474}" dt="2024-03-19T17:27:14.032" v="1438" actId="1076"/>
+          <ac:picMkLst>
+            <pc:docMk/>
+            <pc:sldMk cId="577294232" sldId="273"/>
+            <ac:picMk id="7" creationId="{A68982B8-4A0E-4888-98E2-8A7D513BA5EB}"/>
+          </ac:picMkLst>
+        </pc:picChg>
+      </pc:sldChg>
+      <pc:sldChg chg="addSp delSp modSp new mod">
+        <pc:chgData name="Jinlu Liu" userId="78a8ae01-c209-4833-a803-14efb296c1fa" providerId="ADAL" clId="{EF5F709C-8B25-4768-9E74-67C0B85FC474}" dt="2024-03-19T17:26:54.337" v="1360" actId="20577"/>
+        <pc:sldMkLst>
+          <pc:docMk/>
+          <pc:sldMk cId="4118411064" sldId="274"/>
+        </pc:sldMkLst>
+        <pc:spChg chg="mod">
+          <ac:chgData name="Jinlu Liu" userId="78a8ae01-c209-4833-a803-14efb296c1fa" providerId="ADAL" clId="{EF5F709C-8B25-4768-9E74-67C0B85FC474}" dt="2024-03-19T17:26:54.337" v="1360" actId="20577"/>
+          <ac:spMkLst>
+            <pc:docMk/>
+            <pc:sldMk cId="4118411064" sldId="274"/>
+            <ac:spMk id="2" creationId="{2550C1E4-FF38-49FB-A430-D2423A78CF97}"/>
+          </ac:spMkLst>
+        </pc:spChg>
+        <pc:spChg chg="del">
+          <ac:chgData name="Jinlu Liu" userId="78a8ae01-c209-4833-a803-14efb296c1fa" providerId="ADAL" clId="{EF5F709C-8B25-4768-9E74-67C0B85FC474}" dt="2024-03-19T17:26:17.303" v="1254" actId="478"/>
+          <ac:spMkLst>
+            <pc:docMk/>
+            <pc:sldMk cId="4118411064" sldId="274"/>
+            <ac:spMk id="3" creationId="{410B7E5A-E7CB-40D0-BC69-CC89D308D907}"/>
+          </ac:spMkLst>
+        </pc:spChg>
+        <pc:picChg chg="add mod">
+          <ac:chgData name="Jinlu Liu" userId="78a8ae01-c209-4833-a803-14efb296c1fa" providerId="ADAL" clId="{EF5F709C-8B25-4768-9E74-67C0B85FC474}" dt="2024-03-19T17:26:25.619" v="1257" actId="14100"/>
+          <ac:picMkLst>
+            <pc:docMk/>
+            <pc:sldMk cId="4118411064" sldId="274"/>
+            <ac:picMk id="4" creationId="{CCE1C12A-069F-4C3B-BCFC-7A167D88979F}"/>
+          </ac:picMkLst>
+        </pc:picChg>
+      </pc:sldChg>
+      <pc:sldChg chg="addSp delSp modSp new mod">
+        <pc:chgData name="Jinlu Liu" userId="78a8ae01-c209-4833-a803-14efb296c1fa" providerId="ADAL" clId="{EF5F709C-8B25-4768-9E74-67C0B85FC474}" dt="2024-03-19T17:28:33.600" v="1712" actId="1076"/>
+        <pc:sldMkLst>
+          <pc:docMk/>
+          <pc:sldMk cId="701989169" sldId="275"/>
+        </pc:sldMkLst>
+        <pc:spChg chg="mod">
+          <ac:chgData name="Jinlu Liu" userId="78a8ae01-c209-4833-a803-14efb296c1fa" providerId="ADAL" clId="{EF5F709C-8B25-4768-9E74-67C0B85FC474}" dt="2024-03-19T17:28:18.089" v="1708" actId="20577"/>
+          <ac:spMkLst>
+            <pc:docMk/>
+            <pc:sldMk cId="701989169" sldId="275"/>
+            <ac:spMk id="2" creationId="{12F08DBB-2E9F-4187-9F80-DE6259253DCD}"/>
+          </ac:spMkLst>
+        </pc:spChg>
+        <pc:spChg chg="del">
+          <ac:chgData name="Jinlu Liu" userId="78a8ae01-c209-4833-a803-14efb296c1fa" providerId="ADAL" clId="{EF5F709C-8B25-4768-9E74-67C0B85FC474}" dt="2024-03-19T17:28:21.187" v="1709" actId="478"/>
+          <ac:spMkLst>
+            <pc:docMk/>
+            <pc:sldMk cId="701989169" sldId="275"/>
+            <ac:spMk id="3" creationId="{B8E40A0A-70C3-4FFC-82E3-691020094D25}"/>
+          </ac:spMkLst>
+        </pc:spChg>
+        <pc:picChg chg="add mod">
+          <ac:chgData name="Jinlu Liu" userId="78a8ae01-c209-4833-a803-14efb296c1fa" providerId="ADAL" clId="{EF5F709C-8B25-4768-9E74-67C0B85FC474}" dt="2024-03-19T17:28:33.600" v="1712" actId="1076"/>
+          <ac:picMkLst>
+            <pc:docMk/>
+            <pc:sldMk cId="701989169" sldId="275"/>
+            <ac:picMk id="5" creationId="{8C07AD28-00DE-42D6-ABA8-04CCC4896136}"/>
+          </ac:picMkLst>
+        </pc:picChg>
+      </pc:sldChg>
+      <pc:sldChg chg="addSp delSp modSp new mod">
+        <pc:chgData name="Jinlu Liu" userId="78a8ae01-c209-4833-a803-14efb296c1fa" providerId="ADAL" clId="{EF5F709C-8B25-4768-9E74-67C0B85FC474}" dt="2024-03-20T15:28:00.771" v="2469" actId="14100"/>
+        <pc:sldMkLst>
+          <pc:docMk/>
+          <pc:sldMk cId="1982032632" sldId="276"/>
+        </pc:sldMkLst>
+        <pc:spChg chg="del">
+          <ac:chgData name="Jinlu Liu" userId="78a8ae01-c209-4833-a803-14efb296c1fa" providerId="ADAL" clId="{EF5F709C-8B25-4768-9E74-67C0B85FC474}" dt="2024-03-20T14:41:22.655" v="2031" actId="478"/>
+          <ac:spMkLst>
+            <pc:docMk/>
+            <pc:sldMk cId="1982032632" sldId="276"/>
+            <ac:spMk id="2" creationId="{06B11050-0FB2-4CD4-947A-397A6564806C}"/>
+          </ac:spMkLst>
+        </pc:spChg>
+        <pc:spChg chg="del">
+          <ac:chgData name="Jinlu Liu" userId="78a8ae01-c209-4833-a803-14efb296c1fa" providerId="ADAL" clId="{EF5F709C-8B25-4768-9E74-67C0B85FC474}" dt="2024-03-20T14:41:22.655" v="2031" actId="478"/>
+          <ac:spMkLst>
+            <pc:docMk/>
+            <pc:sldMk cId="1982032632" sldId="276"/>
+            <ac:spMk id="3" creationId="{EE5037BC-FAC0-4C42-A26A-D785FDF300E7}"/>
+          </ac:spMkLst>
+        </pc:spChg>
+        <pc:spChg chg="add mod">
+          <ac:chgData name="Jinlu Liu" userId="78a8ae01-c209-4833-a803-14efb296c1fa" providerId="ADAL" clId="{EF5F709C-8B25-4768-9E74-67C0B85FC474}" dt="2024-03-20T15:27:30.648" v="2455" actId="20577"/>
+          <ac:spMkLst>
+            <pc:docMk/>
+            <pc:sldMk cId="1982032632" sldId="276"/>
+            <ac:spMk id="4" creationId="{81C4C251-7FB9-43E5-8833-0E24CC9B0DBF}"/>
+          </ac:spMkLst>
+        </pc:spChg>
+        <pc:picChg chg="add mod">
+          <ac:chgData name="Jinlu Liu" userId="78a8ae01-c209-4833-a803-14efb296c1fa" providerId="ADAL" clId="{EF5F709C-8B25-4768-9E74-67C0B85FC474}" dt="2024-03-20T15:27:49.791" v="2463" actId="1076"/>
+          <ac:picMkLst>
+            <pc:docMk/>
+            <pc:sldMk cId="1982032632" sldId="276"/>
+            <ac:picMk id="6" creationId="{090B5578-DB3B-4930-B24D-0483BF8F2906}"/>
+          </ac:picMkLst>
+        </pc:picChg>
+        <pc:picChg chg="add mod">
+          <ac:chgData name="Jinlu Liu" userId="78a8ae01-c209-4833-a803-14efb296c1fa" providerId="ADAL" clId="{EF5F709C-8B25-4768-9E74-67C0B85FC474}" dt="2024-03-20T15:28:00.771" v="2469" actId="14100"/>
+          <ac:picMkLst>
+            <pc:docMk/>
+            <pc:sldMk cId="1982032632" sldId="276"/>
+            <ac:picMk id="8" creationId="{36311B2B-EE14-4BE2-A4AE-E3EDA8E1F2DB}"/>
+          </ac:picMkLst>
+        </pc:picChg>
+        <pc:picChg chg="add mod">
+          <ac:chgData name="Jinlu Liu" userId="78a8ae01-c209-4833-a803-14efb296c1fa" providerId="ADAL" clId="{EF5F709C-8B25-4768-9E74-67C0B85FC474}" dt="2024-03-20T15:27:54.614" v="2465" actId="1076"/>
+          <ac:picMkLst>
+            <pc:docMk/>
+            <pc:sldMk cId="1982032632" sldId="276"/>
+            <ac:picMk id="10" creationId="{05050717-B242-4178-94D9-2D0004FD7D83}"/>
+          </ac:picMkLst>
+        </pc:picChg>
+      </pc:sldChg>
+      <pc:sldChg chg="addSp delSp modSp new mod">
+        <pc:chgData name="Jinlu Liu" userId="78a8ae01-c209-4833-a803-14efb296c1fa" providerId="ADAL" clId="{EF5F709C-8B25-4768-9E74-67C0B85FC474}" dt="2024-03-20T15:27:10.397" v="2444" actId="20577"/>
+        <pc:sldMkLst>
+          <pc:docMk/>
+          <pc:sldMk cId="3839730089" sldId="277"/>
+        </pc:sldMkLst>
+        <pc:spChg chg="del">
+          <ac:chgData name="Jinlu Liu" userId="78a8ae01-c209-4833-a803-14efb296c1fa" providerId="ADAL" clId="{EF5F709C-8B25-4768-9E74-67C0B85FC474}" dt="2024-03-20T14:41:35.827" v="2035" actId="478"/>
+          <ac:spMkLst>
+            <pc:docMk/>
+            <pc:sldMk cId="3839730089" sldId="277"/>
+            <ac:spMk id="2" creationId="{F875ABD1-F096-4ABC-8F68-7756E569EC74}"/>
+          </ac:spMkLst>
+        </pc:spChg>
+        <pc:spChg chg="del">
+          <ac:chgData name="Jinlu Liu" userId="78a8ae01-c209-4833-a803-14efb296c1fa" providerId="ADAL" clId="{EF5F709C-8B25-4768-9E74-67C0B85FC474}" dt="2024-03-20T14:41:35.827" v="2035" actId="478"/>
+          <ac:spMkLst>
+            <pc:docMk/>
+            <pc:sldMk cId="3839730089" sldId="277"/>
+            <ac:spMk id="3" creationId="{FB2D3917-DEE8-44BD-AED9-5841467CCD4B}"/>
+          </ac:spMkLst>
+        </pc:spChg>
+        <pc:spChg chg="add mod">
+          <ac:chgData name="Jinlu Liu" userId="78a8ae01-c209-4833-a803-14efb296c1fa" providerId="ADAL" clId="{EF5F709C-8B25-4768-9E74-67C0B85FC474}" dt="2024-03-20T15:27:10.397" v="2444" actId="20577"/>
+          <ac:spMkLst>
+            <pc:docMk/>
+            <pc:sldMk cId="3839730089" sldId="277"/>
+            <ac:spMk id="10" creationId="{11BD8063-13A6-4A85-93D3-578FE5745752}"/>
+          </ac:spMkLst>
+        </pc:spChg>
+        <pc:picChg chg="add mod">
+          <ac:chgData name="Jinlu Liu" userId="78a8ae01-c209-4833-a803-14efb296c1fa" providerId="ADAL" clId="{EF5F709C-8B25-4768-9E74-67C0B85FC474}" dt="2024-03-20T14:42:03.346" v="2051" actId="1076"/>
+          <ac:picMkLst>
+            <pc:docMk/>
+            <pc:sldMk cId="3839730089" sldId="277"/>
+            <ac:picMk id="5" creationId="{EEC8AB54-57AA-4645-BB29-6A1815231F0C}"/>
+          </ac:picMkLst>
+        </pc:picChg>
+        <pc:picChg chg="add mod">
+          <ac:chgData name="Jinlu Liu" userId="78a8ae01-c209-4833-a803-14efb296c1fa" providerId="ADAL" clId="{EF5F709C-8B25-4768-9E74-67C0B85FC474}" dt="2024-03-20T14:42:12.729" v="2054" actId="1076"/>
+          <ac:picMkLst>
+            <pc:docMk/>
+            <pc:sldMk cId="3839730089" sldId="277"/>
+            <ac:picMk id="7" creationId="{11B8688D-4BC3-4A61-8BCB-8DEDEDC44C51}"/>
+          </ac:picMkLst>
+        </pc:picChg>
+        <pc:picChg chg="add mod">
+          <ac:chgData name="Jinlu Liu" userId="78a8ae01-c209-4833-a803-14efb296c1fa" providerId="ADAL" clId="{EF5F709C-8B25-4768-9E74-67C0B85FC474}" dt="2024-03-20T14:42:10.262" v="2053" actId="1076"/>
+          <ac:picMkLst>
+            <pc:docMk/>
+            <pc:sldMk cId="3839730089" sldId="277"/>
+            <ac:picMk id="9" creationId="{7F0C17E5-28E2-4314-8D32-6E841CCAA153}"/>
+          </ac:picMkLst>
+        </pc:picChg>
+      </pc:sldChg>
+      <pc:sldChg chg="addSp delSp modSp new mod">
+        <pc:chgData name="Jinlu Liu" userId="78a8ae01-c209-4833-a803-14efb296c1fa" providerId="ADAL" clId="{EF5F709C-8B25-4768-9E74-67C0B85FC474}" dt="2024-03-21T12:15:11.940" v="2615" actId="20577"/>
+        <pc:sldMkLst>
+          <pc:docMk/>
+          <pc:sldMk cId="1122796300" sldId="278"/>
+        </pc:sldMkLst>
+        <pc:spChg chg="mod">
+          <ac:chgData name="Jinlu Liu" userId="78a8ae01-c209-4833-a803-14efb296c1fa" providerId="ADAL" clId="{EF5F709C-8B25-4768-9E74-67C0B85FC474}" dt="2024-03-21T12:15:11.940" v="2615" actId="20577"/>
+          <ac:spMkLst>
+            <pc:docMk/>
+            <pc:sldMk cId="1122796300" sldId="278"/>
+            <ac:spMk id="2" creationId="{A7F84956-1E86-4F39-B8B7-EB55C3975013}"/>
+          </ac:spMkLst>
+        </pc:spChg>
+        <pc:spChg chg="del">
+          <ac:chgData name="Jinlu Liu" userId="78a8ae01-c209-4833-a803-14efb296c1fa" providerId="ADAL" clId="{EF5F709C-8B25-4768-9E74-67C0B85FC474}" dt="2024-03-21T12:14:28.397" v="2471"/>
+          <ac:spMkLst>
+            <pc:docMk/>
+            <pc:sldMk cId="1122796300" sldId="278"/>
+            <ac:spMk id="3" creationId="{70A9F174-647B-42F0-A230-1660FE436EF4}"/>
+          </ac:spMkLst>
+        </pc:spChg>
+        <pc:picChg chg="add mod">
+          <ac:chgData name="Jinlu Liu" userId="78a8ae01-c209-4833-a803-14efb296c1fa" providerId="ADAL" clId="{EF5F709C-8B25-4768-9E74-67C0B85FC474}" dt="2024-03-21T12:14:31.360" v="2472" actId="1076"/>
+          <ac:picMkLst>
+            <pc:docMk/>
+            <pc:sldMk cId="1122796300" sldId="278"/>
+            <ac:picMk id="5" creationId="{341F9615-FC71-48EA-A015-0FBC684FEC72}"/>
           </ac:picMkLst>
         </pc:picChg>
       </pc:sldChg>
@@ -498,7 +1201,7 @@
           <a:p>
             <a:fld id="{8B0FBBE1-BCB1-40B2-BF98-41E3403F3059}" type="datetimeFigureOut">
               <a:rPr lang="en-GB" smtClean="0"/>
-              <a:t>14/03/2024</a:t>
+              <a:t>21/03/2024</a:t>
             </a:fld>
             <a:endParaRPr lang="en-GB"/>
           </a:p>
@@ -698,7 +1401,7 @@
           <a:p>
             <a:fld id="{8B0FBBE1-BCB1-40B2-BF98-41E3403F3059}" type="datetimeFigureOut">
               <a:rPr lang="en-GB" smtClean="0"/>
-              <a:t>14/03/2024</a:t>
+              <a:t>21/03/2024</a:t>
             </a:fld>
             <a:endParaRPr lang="en-GB"/>
           </a:p>
@@ -908,7 +1611,7 @@
           <a:p>
             <a:fld id="{8B0FBBE1-BCB1-40B2-BF98-41E3403F3059}" type="datetimeFigureOut">
               <a:rPr lang="en-GB" smtClean="0"/>
-              <a:t>14/03/2024</a:t>
+              <a:t>21/03/2024</a:t>
             </a:fld>
             <a:endParaRPr lang="en-GB"/>
           </a:p>
@@ -1108,7 +1811,7 @@
           <a:p>
             <a:fld id="{8B0FBBE1-BCB1-40B2-BF98-41E3403F3059}" type="datetimeFigureOut">
               <a:rPr lang="en-GB" smtClean="0"/>
-              <a:t>14/03/2024</a:t>
+              <a:t>21/03/2024</a:t>
             </a:fld>
             <a:endParaRPr lang="en-GB"/>
           </a:p>
@@ -1384,7 +2087,7 @@
           <a:p>
             <a:fld id="{8B0FBBE1-BCB1-40B2-BF98-41E3403F3059}" type="datetimeFigureOut">
               <a:rPr lang="en-GB" smtClean="0"/>
-              <a:t>14/03/2024</a:t>
+              <a:t>21/03/2024</a:t>
             </a:fld>
             <a:endParaRPr lang="en-GB"/>
           </a:p>
@@ -1652,7 +2355,7 @@
           <a:p>
             <a:fld id="{8B0FBBE1-BCB1-40B2-BF98-41E3403F3059}" type="datetimeFigureOut">
               <a:rPr lang="en-GB" smtClean="0"/>
-              <a:t>14/03/2024</a:t>
+              <a:t>21/03/2024</a:t>
             </a:fld>
             <a:endParaRPr lang="en-GB"/>
           </a:p>
@@ -2067,7 +2770,7 @@
           <a:p>
             <a:fld id="{8B0FBBE1-BCB1-40B2-BF98-41E3403F3059}" type="datetimeFigureOut">
               <a:rPr lang="en-GB" smtClean="0"/>
-              <a:t>14/03/2024</a:t>
+              <a:t>21/03/2024</a:t>
             </a:fld>
             <a:endParaRPr lang="en-GB"/>
           </a:p>
@@ -2209,7 +2912,7 @@
           <a:p>
             <a:fld id="{8B0FBBE1-BCB1-40B2-BF98-41E3403F3059}" type="datetimeFigureOut">
               <a:rPr lang="en-GB" smtClean="0"/>
-              <a:t>14/03/2024</a:t>
+              <a:t>21/03/2024</a:t>
             </a:fld>
             <a:endParaRPr lang="en-GB"/>
           </a:p>
@@ -2322,7 +3025,7 @@
           <a:p>
             <a:fld id="{8B0FBBE1-BCB1-40B2-BF98-41E3403F3059}" type="datetimeFigureOut">
               <a:rPr lang="en-GB" smtClean="0"/>
-              <a:t>14/03/2024</a:t>
+              <a:t>21/03/2024</a:t>
             </a:fld>
             <a:endParaRPr lang="en-GB"/>
           </a:p>
@@ -2635,7 +3338,7 @@
           <a:p>
             <a:fld id="{8B0FBBE1-BCB1-40B2-BF98-41E3403F3059}" type="datetimeFigureOut">
               <a:rPr lang="en-GB" smtClean="0"/>
-              <a:t>14/03/2024</a:t>
+              <a:t>21/03/2024</a:t>
             </a:fld>
             <a:endParaRPr lang="en-GB"/>
           </a:p>
@@ -2924,7 +3627,7 @@
           <a:p>
             <a:fld id="{8B0FBBE1-BCB1-40B2-BF98-41E3403F3059}" type="datetimeFigureOut">
               <a:rPr lang="en-GB" smtClean="0"/>
-              <a:t>14/03/2024</a:t>
+              <a:t>21/03/2024</a:t>
             </a:fld>
             <a:endParaRPr lang="en-GB"/>
           </a:p>
@@ -3167,7 +3870,7 @@
           <a:p>
             <a:fld id="{8B0FBBE1-BCB1-40B2-BF98-41E3403F3059}" type="datetimeFigureOut">
               <a:rPr lang="en-GB" smtClean="0"/>
-              <a:t>14/03/2024</a:t>
+              <a:t>21/03/2024</a:t>
             </a:fld>
             <a:endParaRPr lang="en-GB"/>
           </a:p>
@@ -3735,7 +4438,7 @@
 </p:sld>
 </file>
 
-<file path=ppt/slides/slide2.xml><?xml version="1.0" encoding="utf-8"?>
+<file path=ppt/slides/slide10.xml><?xml version="1.0" encoding="utf-8"?>
 <p:sld xmlns:a="http://schemas.openxmlformats.org/drawingml/2006/main" xmlns:r="http://schemas.openxmlformats.org/officeDocument/2006/relationships" xmlns:p="http://schemas.openxmlformats.org/presentationml/2006/main">
   <p:cSld>
     <p:spTree>
@@ -3754,58 +4457,79 @@
       </p:grpSpPr>
       <p:sp>
         <p:nvSpPr>
-          <p:cNvPr id="2" name="Title 1">
-            <a:extLst>
-              <a:ext uri="{FF2B5EF4-FFF2-40B4-BE49-F238E27FC236}">
-                <a16:creationId xmlns:a16="http://schemas.microsoft.com/office/drawing/2014/main" id="{D7FEA48D-900B-4346-991E-8A6261C49B87}"/>
-              </a:ext>
-            </a:extLst>
-          </p:cNvPr>
-          <p:cNvSpPr>
-            <a:spLocks noGrp="1"/>
-          </p:cNvSpPr>
-          <p:nvPr>
-            <p:ph type="title"/>
-          </p:nvPr>
-        </p:nvSpPr>
-        <p:spPr/>
-        <p:txBody>
-          <a:bodyPr/>
+          <p:cNvPr id="5" name="TextBox 4">
+            <a:extLst>
+              <a:ext uri="{FF2B5EF4-FFF2-40B4-BE49-F238E27FC236}">
+                <a16:creationId xmlns:a16="http://schemas.microsoft.com/office/drawing/2014/main" id="{96F5F208-B143-4C66-82F2-5C631A05EC43}"/>
+              </a:ext>
+            </a:extLst>
+          </p:cNvPr>
+          <p:cNvSpPr txBox="1"/>
+          <p:nvPr/>
+        </p:nvSpPr>
+        <p:spPr>
+          <a:xfrm>
+            <a:off x="983609" y="687789"/>
+            <a:ext cx="6094602" cy="323165"/>
+          </a:xfrm>
+          <a:prstGeom prst="rect">
+            <a:avLst/>
+          </a:prstGeom>
+          <a:noFill/>
+        </p:spPr>
+        <p:txBody>
+          <a:bodyPr wrap="square">
+            <a:spAutoFit/>
+          </a:bodyPr>
           <a:lstStyle/>
           <a:p>
-            <a:endParaRPr lang="en-GB"/>
-          </a:p>
-        </p:txBody>
-      </p:sp>
-      <p:sp>
-        <p:nvSpPr>
-          <p:cNvPr id="3" name="Content Placeholder 2">
-            <a:extLst>
-              <a:ext uri="{FF2B5EF4-FFF2-40B4-BE49-F238E27FC236}">
-                <a16:creationId xmlns:a16="http://schemas.microsoft.com/office/drawing/2014/main" id="{7EC644D2-496F-40A8-8C09-C6C3A4190DA9}"/>
-              </a:ext>
-            </a:extLst>
-          </p:cNvPr>
-          <p:cNvSpPr>
-            <a:spLocks noGrp="1"/>
-          </p:cNvSpPr>
-          <p:nvPr>
-            <p:ph idx="1"/>
-          </p:nvPr>
-        </p:nvSpPr>
-        <p:spPr/>
-        <p:txBody>
-          <a:bodyPr/>
-          <a:lstStyle/>
-          <a:p>
-            <a:endParaRPr lang="en-GB"/>
-          </a:p>
-        </p:txBody>
-      </p:sp>
+            <a:r>
+              <a:rPr lang="en-GB" sz="1500" dirty="0"/>
+              <a:t>Comparison of allocation proportions across any two mice:</a:t>
+            </a:r>
+          </a:p>
+        </p:txBody>
+      </p:sp>
+      <p:pic>
+        <p:nvPicPr>
+          <p:cNvPr id="7" name="Picture 6">
+            <a:extLst>
+              <a:ext uri="{FF2B5EF4-FFF2-40B4-BE49-F238E27FC236}">
+                <a16:creationId xmlns:a16="http://schemas.microsoft.com/office/drawing/2014/main" id="{E828E7A8-3A1F-44D0-B64B-1457346EC21D}"/>
+              </a:ext>
+            </a:extLst>
+          </p:cNvPr>
+          <p:cNvPicPr>
+            <a:picLocks noChangeAspect="1"/>
+          </p:cNvPicPr>
+          <p:nvPr/>
+        </p:nvPicPr>
+        <p:blipFill>
+          <a:blip r:embed="rId2">
+            <a:extLst>
+              <a:ext uri="{28A0092B-C50C-407E-A947-70E740481C1C}">
+                <a14:useLocalDpi xmlns:a14="http://schemas.microsoft.com/office/drawing/2010/main" val="0"/>
+              </a:ext>
+            </a:extLst>
+          </a:blip>
+          <a:stretch>
+            <a:fillRect/>
+          </a:stretch>
+        </p:blipFill>
+        <p:spPr>
+          <a:xfrm>
+            <a:off x="0" y="1600200"/>
+            <a:ext cx="12192000" cy="3657600"/>
+          </a:xfrm>
+          <a:prstGeom prst="rect">
+            <a:avLst/>
+          </a:prstGeom>
+        </p:spPr>
+      </p:pic>
     </p:spTree>
     <p:extLst>
       <p:ext uri="{BB962C8B-B14F-4D97-AF65-F5344CB8AC3E}">
-        <p14:creationId xmlns:p14="http://schemas.microsoft.com/office/powerpoint/2010/main" val="3127050744"/>
+        <p14:creationId xmlns:p14="http://schemas.microsoft.com/office/powerpoint/2010/main" val="4177573298"/>
       </p:ext>
     </p:extLst>
   </p:cSld>
@@ -3815,7 +4539,7 @@
 </p:sld>
 </file>
 
-<file path=ppt/slides/slide3.xml><?xml version="1.0" encoding="utf-8"?>
+<file path=ppt/slides/slide11.xml><?xml version="1.0" encoding="utf-8"?>
 <p:sld xmlns:a="http://schemas.openxmlformats.org/drawingml/2006/main" xmlns:r="http://schemas.openxmlformats.org/officeDocument/2006/relationships" xmlns:p="http://schemas.openxmlformats.org/presentationml/2006/main">
   <p:cSld>
     <p:spTree>
@@ -3837,6 +4561,511 @@
           <p:cNvPr id="2" name="Title 1">
             <a:extLst>
               <a:ext uri="{FF2B5EF4-FFF2-40B4-BE49-F238E27FC236}">
+                <a16:creationId xmlns:a16="http://schemas.microsoft.com/office/drawing/2014/main" id="{260AEF4F-F353-4A12-9501-6016D8BC853D}"/>
+              </a:ext>
+            </a:extLst>
+          </p:cNvPr>
+          <p:cNvSpPr>
+            <a:spLocks noGrp="1"/>
+          </p:cNvSpPr>
+          <p:nvPr>
+            <p:ph type="title"/>
+          </p:nvPr>
+        </p:nvSpPr>
+        <p:spPr>
+          <a:xfrm>
+            <a:off x="838200" y="365125"/>
+            <a:ext cx="10515600" cy="800945"/>
+          </a:xfrm>
+        </p:spPr>
+        <p:txBody>
+          <a:bodyPr>
+            <a:normAutofit/>
+          </a:bodyPr>
+          <a:lstStyle/>
+          <a:p>
+            <a:r>
+              <a:rPr lang="en-GB" sz="1500" dirty="0"/>
+              <a:t>Probability of having the projection strength greater than 0.01 for each cluster and region:</a:t>
+            </a:r>
+          </a:p>
+        </p:txBody>
+      </p:sp>
+      <p:pic>
+        <p:nvPicPr>
+          <p:cNvPr id="5" name="Picture 4">
+            <a:extLst>
+              <a:ext uri="{FF2B5EF4-FFF2-40B4-BE49-F238E27FC236}">
+                <a16:creationId xmlns:a16="http://schemas.microsoft.com/office/drawing/2014/main" id="{77BC6A5D-C037-49D5-9B6C-98AEBC0141E7}"/>
+              </a:ext>
+            </a:extLst>
+          </p:cNvPr>
+          <p:cNvPicPr>
+            <a:picLocks noChangeAspect="1"/>
+          </p:cNvPicPr>
+          <p:nvPr/>
+        </p:nvPicPr>
+        <p:blipFill>
+          <a:blip r:embed="rId2">
+            <a:extLst>
+              <a:ext uri="{28A0092B-C50C-407E-A947-70E740481C1C}">
+                <a14:useLocalDpi xmlns:a14="http://schemas.microsoft.com/office/drawing/2010/main" val="0"/>
+              </a:ext>
+            </a:extLst>
+          </a:blip>
+          <a:stretch>
+            <a:fillRect/>
+          </a:stretch>
+        </p:blipFill>
+        <p:spPr>
+          <a:xfrm>
+            <a:off x="0" y="2209800"/>
+            <a:ext cx="12192000" cy="2438400"/>
+          </a:xfrm>
+          <a:prstGeom prst="rect">
+            <a:avLst/>
+          </a:prstGeom>
+        </p:spPr>
+      </p:pic>
+    </p:spTree>
+    <p:extLst>
+      <p:ext uri="{BB962C8B-B14F-4D97-AF65-F5344CB8AC3E}">
+        <p14:creationId xmlns:p14="http://schemas.microsoft.com/office/powerpoint/2010/main" val="4191853831"/>
+      </p:ext>
+    </p:extLst>
+  </p:cSld>
+  <p:clrMapOvr>
+    <a:masterClrMapping/>
+  </p:clrMapOvr>
+</p:sld>
+</file>
+
+<file path=ppt/slides/slide12.xml><?xml version="1.0" encoding="utf-8"?>
+<p:sld xmlns:a="http://schemas.openxmlformats.org/drawingml/2006/main" xmlns:r="http://schemas.openxmlformats.org/officeDocument/2006/relationships" xmlns:p="http://schemas.openxmlformats.org/presentationml/2006/main">
+  <p:cSld>
+    <p:spTree>
+      <p:nvGrpSpPr>
+        <p:cNvPr id="1" name=""/>
+        <p:cNvGrpSpPr/>
+        <p:nvPr/>
+      </p:nvGrpSpPr>
+      <p:grpSpPr>
+        <a:xfrm>
+          <a:off x="0" y="0"/>
+          <a:ext cx="0" cy="0"/>
+          <a:chOff x="0" y="0"/>
+          <a:chExt cx="0" cy="0"/>
+        </a:xfrm>
+      </p:grpSpPr>
+      <p:sp>
+        <p:nvSpPr>
+          <p:cNvPr id="2" name="Title 1">
+            <a:extLst>
+              <a:ext uri="{FF2B5EF4-FFF2-40B4-BE49-F238E27FC236}">
+                <a16:creationId xmlns:a16="http://schemas.microsoft.com/office/drawing/2014/main" id="{E2A79BAC-4DC5-461E-A69F-0C5B0805BF6D}"/>
+              </a:ext>
+            </a:extLst>
+          </p:cNvPr>
+          <p:cNvSpPr>
+            <a:spLocks noGrp="1"/>
+          </p:cNvSpPr>
+          <p:nvPr>
+            <p:ph type="title"/>
+          </p:nvPr>
+        </p:nvSpPr>
+        <p:spPr>
+          <a:xfrm>
+            <a:off x="838200" y="365126"/>
+            <a:ext cx="10515600" cy="708666"/>
+          </a:xfrm>
+        </p:spPr>
+        <p:txBody>
+          <a:bodyPr>
+            <a:normAutofit/>
+          </a:bodyPr>
+          <a:lstStyle/>
+          <a:p>
+            <a:r>
+              <a:rPr lang="en-GB" sz="1500" dirty="0"/>
+              <a:t>Example of significant difference in allocation proportions between mouse pairs:</a:t>
+            </a:r>
+          </a:p>
+        </p:txBody>
+      </p:sp>
+      <p:pic>
+        <p:nvPicPr>
+          <p:cNvPr id="5" name="Picture 4">
+            <a:extLst>
+              <a:ext uri="{FF2B5EF4-FFF2-40B4-BE49-F238E27FC236}">
+                <a16:creationId xmlns:a16="http://schemas.microsoft.com/office/drawing/2014/main" id="{F0D32078-D2FC-4B62-ACB4-52E22D4D5C7C}"/>
+              </a:ext>
+            </a:extLst>
+          </p:cNvPr>
+          <p:cNvPicPr>
+            <a:picLocks noChangeAspect="1"/>
+          </p:cNvPicPr>
+          <p:nvPr/>
+        </p:nvPicPr>
+        <p:blipFill>
+          <a:blip r:embed="rId2">
+            <a:extLst>
+              <a:ext uri="{28A0092B-C50C-407E-A947-70E740481C1C}">
+                <a14:useLocalDpi xmlns:a14="http://schemas.microsoft.com/office/drawing/2010/main" val="0"/>
+              </a:ext>
+            </a:extLst>
+          </a:blip>
+          <a:stretch>
+            <a:fillRect/>
+          </a:stretch>
+        </p:blipFill>
+        <p:spPr>
+          <a:xfrm>
+            <a:off x="838200" y="1292790"/>
+            <a:ext cx="9373038" cy="4998953"/>
+          </a:xfrm>
+          <a:prstGeom prst="rect">
+            <a:avLst/>
+          </a:prstGeom>
+        </p:spPr>
+      </p:pic>
+    </p:spTree>
+    <p:extLst>
+      <p:ext uri="{BB962C8B-B14F-4D97-AF65-F5344CB8AC3E}">
+        <p14:creationId xmlns:p14="http://schemas.microsoft.com/office/powerpoint/2010/main" val="203089995"/>
+      </p:ext>
+    </p:extLst>
+  </p:cSld>
+  <p:clrMapOvr>
+    <a:masterClrMapping/>
+  </p:clrMapOvr>
+</p:sld>
+</file>
+
+<file path=ppt/slides/slide13.xml><?xml version="1.0" encoding="utf-8"?>
+<p:sld xmlns:a="http://schemas.openxmlformats.org/drawingml/2006/main" xmlns:r="http://schemas.openxmlformats.org/officeDocument/2006/relationships" xmlns:p="http://schemas.openxmlformats.org/presentationml/2006/main">
+  <p:cSld>
+    <p:spTree>
+      <p:nvGrpSpPr>
+        <p:cNvPr id="1" name=""/>
+        <p:cNvGrpSpPr/>
+        <p:nvPr/>
+      </p:nvGrpSpPr>
+      <p:grpSpPr>
+        <a:xfrm>
+          <a:off x="0" y="0"/>
+          <a:ext cx="0" cy="0"/>
+          <a:chOff x="0" y="0"/>
+          <a:chExt cx="0" cy="0"/>
+        </a:xfrm>
+      </p:grpSpPr>
+      <p:sp>
+        <p:nvSpPr>
+          <p:cNvPr id="2" name="Title 1">
+            <a:extLst>
+              <a:ext uri="{FF2B5EF4-FFF2-40B4-BE49-F238E27FC236}">
+                <a16:creationId xmlns:a16="http://schemas.microsoft.com/office/drawing/2014/main" id="{BD29CE6C-0DB2-4143-AB0A-2E6158AC647B}"/>
+              </a:ext>
+            </a:extLst>
+          </p:cNvPr>
+          <p:cNvSpPr>
+            <a:spLocks noGrp="1"/>
+          </p:cNvSpPr>
+          <p:nvPr>
+            <p:ph type="title"/>
+          </p:nvPr>
+        </p:nvSpPr>
+        <p:spPr>
+          <a:xfrm>
+            <a:off x="838200" y="365125"/>
+            <a:ext cx="10515600" cy="616387"/>
+          </a:xfrm>
+        </p:spPr>
+        <p:txBody>
+          <a:bodyPr>
+            <a:normAutofit/>
+          </a:bodyPr>
+          <a:lstStyle/>
+          <a:p>
+            <a:r>
+              <a:rPr lang="en-GB" sz="1500" dirty="0"/>
+              <a:t>Posterior predictive check with three replicated datasets: (number of zeros of each region). This is used to assess the fit of the model to the data.</a:t>
+            </a:r>
+          </a:p>
+        </p:txBody>
+      </p:sp>
+      <p:pic>
+        <p:nvPicPr>
+          <p:cNvPr id="7" name="Picture 6">
+            <a:extLst>
+              <a:ext uri="{FF2B5EF4-FFF2-40B4-BE49-F238E27FC236}">
+                <a16:creationId xmlns:a16="http://schemas.microsoft.com/office/drawing/2014/main" id="{A68982B8-4A0E-4888-98E2-8A7D513BA5EB}"/>
+              </a:ext>
+            </a:extLst>
+          </p:cNvPr>
+          <p:cNvPicPr>
+            <a:picLocks noChangeAspect="1"/>
+          </p:cNvPicPr>
+          <p:nvPr/>
+        </p:nvPicPr>
+        <p:blipFill>
+          <a:blip r:embed="rId2">
+            <a:extLst>
+              <a:ext uri="{28A0092B-C50C-407E-A947-70E740481C1C}">
+                <a14:useLocalDpi xmlns:a14="http://schemas.microsoft.com/office/drawing/2010/main" val="0"/>
+              </a:ext>
+            </a:extLst>
+          </a:blip>
+          <a:stretch>
+            <a:fillRect/>
+          </a:stretch>
+        </p:blipFill>
+        <p:spPr>
+          <a:xfrm>
+            <a:off x="838200" y="1606025"/>
+            <a:ext cx="7055840" cy="4115907"/>
+          </a:xfrm>
+          <a:prstGeom prst="rect">
+            <a:avLst/>
+          </a:prstGeom>
+        </p:spPr>
+      </p:pic>
+    </p:spTree>
+    <p:extLst>
+      <p:ext uri="{BB962C8B-B14F-4D97-AF65-F5344CB8AC3E}">
+        <p14:creationId xmlns:p14="http://schemas.microsoft.com/office/powerpoint/2010/main" val="577294232"/>
+      </p:ext>
+    </p:extLst>
+  </p:cSld>
+  <p:clrMapOvr>
+    <a:masterClrMapping/>
+  </p:clrMapOvr>
+</p:sld>
+</file>
+
+<file path=ppt/slides/slide14.xml><?xml version="1.0" encoding="utf-8"?>
+<p:sld xmlns:a="http://schemas.openxmlformats.org/drawingml/2006/main" xmlns:r="http://schemas.openxmlformats.org/officeDocument/2006/relationships" xmlns:p="http://schemas.openxmlformats.org/presentationml/2006/main">
+  <p:cSld>
+    <p:spTree>
+      <p:nvGrpSpPr>
+        <p:cNvPr id="1" name=""/>
+        <p:cNvGrpSpPr/>
+        <p:nvPr/>
+      </p:nvGrpSpPr>
+      <p:grpSpPr>
+        <a:xfrm>
+          <a:off x="0" y="0"/>
+          <a:ext cx="0" cy="0"/>
+          <a:chOff x="0" y="0"/>
+          <a:chExt cx="0" cy="0"/>
+        </a:xfrm>
+      </p:grpSpPr>
+      <p:sp>
+        <p:nvSpPr>
+          <p:cNvPr id="2" name="Title 1">
+            <a:extLst>
+              <a:ext uri="{FF2B5EF4-FFF2-40B4-BE49-F238E27FC236}">
+                <a16:creationId xmlns:a16="http://schemas.microsoft.com/office/drawing/2014/main" id="{2550C1E4-FF38-49FB-A430-D2423A78CF97}"/>
+              </a:ext>
+            </a:extLst>
+          </p:cNvPr>
+          <p:cNvSpPr>
+            <a:spLocks noGrp="1"/>
+          </p:cNvSpPr>
+          <p:nvPr>
+            <p:ph type="title"/>
+          </p:nvPr>
+        </p:nvSpPr>
+        <p:spPr>
+          <a:xfrm>
+            <a:off x="838200" y="365125"/>
+            <a:ext cx="10515600" cy="817723"/>
+          </a:xfrm>
+        </p:spPr>
+        <p:txBody>
+          <a:bodyPr>
+            <a:normAutofit/>
+          </a:bodyPr>
+          <a:lstStyle/>
+          <a:p>
+            <a:r>
+              <a:rPr lang="en-GB" sz="1500" dirty="0"/>
+              <a:t>Distribution of non-zero projection strengths for the observed and replicated data.</a:t>
+            </a:r>
+          </a:p>
+        </p:txBody>
+      </p:sp>
+      <p:pic>
+        <p:nvPicPr>
+          <p:cNvPr id="4" name="Picture 3">
+            <a:extLst>
+              <a:ext uri="{FF2B5EF4-FFF2-40B4-BE49-F238E27FC236}">
+                <a16:creationId xmlns:a16="http://schemas.microsoft.com/office/drawing/2014/main" id="{CCE1C12A-069F-4C3B-BCFC-7A167D88979F}"/>
+              </a:ext>
+            </a:extLst>
+          </p:cNvPr>
+          <p:cNvPicPr>
+            <a:picLocks noChangeAspect="1"/>
+          </p:cNvPicPr>
+          <p:nvPr/>
+        </p:nvPicPr>
+        <p:blipFill>
+          <a:blip r:embed="rId2">
+            <a:extLst>
+              <a:ext uri="{28A0092B-C50C-407E-A947-70E740481C1C}">
+                <a14:useLocalDpi xmlns:a14="http://schemas.microsoft.com/office/drawing/2010/main" val="0"/>
+              </a:ext>
+            </a:extLst>
+          </a:blip>
+          <a:stretch>
+            <a:fillRect/>
+          </a:stretch>
+        </p:blipFill>
+        <p:spPr>
+          <a:xfrm>
+            <a:off x="902865" y="1690687"/>
+            <a:ext cx="7369801" cy="4299051"/>
+          </a:xfrm>
+          <a:prstGeom prst="rect">
+            <a:avLst/>
+          </a:prstGeom>
+        </p:spPr>
+      </p:pic>
+    </p:spTree>
+    <p:extLst>
+      <p:ext uri="{BB962C8B-B14F-4D97-AF65-F5344CB8AC3E}">
+        <p14:creationId xmlns:p14="http://schemas.microsoft.com/office/powerpoint/2010/main" val="4118411064"/>
+      </p:ext>
+    </p:extLst>
+  </p:cSld>
+  <p:clrMapOvr>
+    <a:masterClrMapping/>
+  </p:clrMapOvr>
+</p:sld>
+</file>
+
+<file path=ppt/slides/slide15.xml><?xml version="1.0" encoding="utf-8"?>
+<p:sld xmlns:a="http://schemas.openxmlformats.org/drawingml/2006/main" xmlns:r="http://schemas.openxmlformats.org/officeDocument/2006/relationships" xmlns:p="http://schemas.openxmlformats.org/presentationml/2006/main">
+  <p:cSld>
+    <p:spTree>
+      <p:nvGrpSpPr>
+        <p:cNvPr id="1" name=""/>
+        <p:cNvGrpSpPr/>
+        <p:nvPr/>
+      </p:nvGrpSpPr>
+      <p:grpSpPr>
+        <a:xfrm>
+          <a:off x="0" y="0"/>
+          <a:ext cx="0" cy="0"/>
+          <a:chOff x="0" y="0"/>
+          <a:chExt cx="0" cy="0"/>
+        </a:xfrm>
+      </p:grpSpPr>
+      <p:sp>
+        <p:nvSpPr>
+          <p:cNvPr id="2" name="Title 1">
+            <a:extLst>
+              <a:ext uri="{FF2B5EF4-FFF2-40B4-BE49-F238E27FC236}">
+                <a16:creationId xmlns:a16="http://schemas.microsoft.com/office/drawing/2014/main" id="{12F08DBB-2E9F-4187-9F80-DE6259253DCD}"/>
+              </a:ext>
+            </a:extLst>
+          </p:cNvPr>
+          <p:cNvSpPr>
+            <a:spLocks noGrp="1"/>
+          </p:cNvSpPr>
+          <p:nvPr>
+            <p:ph type="title"/>
+          </p:nvPr>
+        </p:nvSpPr>
+        <p:spPr>
+          <a:xfrm>
+            <a:off x="838200" y="365126"/>
+            <a:ext cx="10515600" cy="943558"/>
+          </a:xfrm>
+        </p:spPr>
+        <p:txBody>
+          <a:bodyPr>
+            <a:normAutofit/>
+          </a:bodyPr>
+          <a:lstStyle/>
+          <a:p>
+            <a:r>
+              <a:rPr lang="en-GB" sz="1500" dirty="0"/>
+              <a:t>We can also carry out posterior predictive check with single replicated dataset. Figure below compares the distribution of projection strengths of neurons in mouse 1.</a:t>
+            </a:r>
+          </a:p>
+        </p:txBody>
+      </p:sp>
+      <p:pic>
+        <p:nvPicPr>
+          <p:cNvPr id="5" name="Picture 4">
+            <a:extLst>
+              <a:ext uri="{FF2B5EF4-FFF2-40B4-BE49-F238E27FC236}">
+                <a16:creationId xmlns:a16="http://schemas.microsoft.com/office/drawing/2014/main" id="{8C07AD28-00DE-42D6-ABA8-04CCC4896136}"/>
+              </a:ext>
+            </a:extLst>
+          </p:cNvPr>
+          <p:cNvPicPr>
+            <a:picLocks noChangeAspect="1"/>
+          </p:cNvPicPr>
+          <p:nvPr/>
+        </p:nvPicPr>
+        <p:blipFill>
+          <a:blip r:embed="rId2">
+            <a:extLst>
+              <a:ext uri="{28A0092B-C50C-407E-A947-70E740481C1C}">
+                <a14:useLocalDpi xmlns:a14="http://schemas.microsoft.com/office/drawing/2010/main" val="0"/>
+              </a:ext>
+            </a:extLst>
+          </a:blip>
+          <a:stretch>
+            <a:fillRect/>
+          </a:stretch>
+        </p:blipFill>
+        <p:spPr>
+          <a:xfrm>
+            <a:off x="838200" y="1190305"/>
+            <a:ext cx="9308284" cy="5429832"/>
+          </a:xfrm>
+          <a:prstGeom prst="rect">
+            <a:avLst/>
+          </a:prstGeom>
+        </p:spPr>
+      </p:pic>
+    </p:spTree>
+    <p:extLst>
+      <p:ext uri="{BB962C8B-B14F-4D97-AF65-F5344CB8AC3E}">
+        <p14:creationId xmlns:p14="http://schemas.microsoft.com/office/powerpoint/2010/main" val="701989169"/>
+      </p:ext>
+    </p:extLst>
+  </p:cSld>
+  <p:clrMapOvr>
+    <a:masterClrMapping/>
+  </p:clrMapOvr>
+</p:sld>
+</file>
+
+<file path=ppt/slides/slide16.xml><?xml version="1.0" encoding="utf-8"?>
+<p:sld xmlns:a="http://schemas.openxmlformats.org/drawingml/2006/main" xmlns:r="http://schemas.openxmlformats.org/officeDocument/2006/relationships" xmlns:p="http://schemas.openxmlformats.org/presentationml/2006/main">
+  <p:cSld>
+    <p:spTree>
+      <p:nvGrpSpPr>
+        <p:cNvPr id="1" name=""/>
+        <p:cNvGrpSpPr/>
+        <p:nvPr/>
+      </p:nvGrpSpPr>
+      <p:grpSpPr>
+        <a:xfrm>
+          <a:off x="0" y="0"/>
+          <a:ext cx="0" cy="0"/>
+          <a:chOff x="0" y="0"/>
+          <a:chExt cx="0" cy="0"/>
+        </a:xfrm>
+      </p:grpSpPr>
+      <p:sp>
+        <p:nvSpPr>
+          <p:cNvPr id="2" name="Title 1">
+            <a:extLst>
+              <a:ext uri="{FF2B5EF4-FFF2-40B4-BE49-F238E27FC236}">
                 <a16:creationId xmlns:a16="http://schemas.microsoft.com/office/drawing/2014/main" id="{EEA191DD-A919-431C-8856-F344353F563B}"/>
               </a:ext>
             </a:extLst>
@@ -3848,12 +5077,27 @@
             <p:ph type="title"/>
           </p:nvPr>
         </p:nvSpPr>
-        <p:spPr/>
-        <p:txBody>
-          <a:bodyPr/>
+        <p:spPr>
+          <a:xfrm>
+            <a:off x="838200" y="365126"/>
+            <a:ext cx="10515600" cy="876446"/>
+          </a:xfrm>
+        </p:spPr>
+        <p:txBody>
+          <a:bodyPr>
+            <a:normAutofit/>
+          </a:bodyPr>
           <a:lstStyle/>
           <a:p>
-            <a:endParaRPr lang="en-GB"/>
+            <a:r>
+              <a:rPr lang="en-GB" sz="1500" dirty="0"/>
+              <a:t>Here we present the relationship between the total number of clusters found by the k-means method and the total sum of square within </a:t>
+            </a:r>
+            <a:r>
+              <a:rPr lang="en-GB" sz="1500"/>
+              <a:t>each cluster.</a:t>
+            </a:r>
+            <a:endParaRPr lang="en-GB" sz="1500" dirty="0"/>
           </a:p>
         </p:txBody>
       </p:sp>
@@ -3905,7 +5149,7 @@
 </p:sld>
 </file>
 
-<file path=ppt/slides/slide4.xml><?xml version="1.0" encoding="utf-8"?>
+<file path=ppt/slides/slide17.xml><?xml version="1.0" encoding="utf-8"?>
 <p:sld xmlns:a="http://schemas.openxmlformats.org/drawingml/2006/main" xmlns:r="http://schemas.openxmlformats.org/officeDocument/2006/relationships" xmlns:p="http://schemas.openxmlformats.org/presentationml/2006/main">
   <p:cSld>
     <p:spTree>
@@ -4006,7 +5250,7 @@
 </p:sld>
 </file>
 
-<file path=ppt/slides/slide5.xml><?xml version="1.0" encoding="utf-8"?>
+<file path=ppt/slides/slide18.xml><?xml version="1.0" encoding="utf-8"?>
 <p:sld xmlns:a="http://schemas.openxmlformats.org/drawingml/2006/main" xmlns:r="http://schemas.openxmlformats.org/officeDocument/2006/relationships" xmlns:p="http://schemas.openxmlformats.org/presentationml/2006/main">
   <p:cSld>
     <p:spTree>
@@ -4107,7 +5351,7 @@
 </p:sld>
 </file>
 
-<file path=ppt/slides/slide6.xml><?xml version="1.0" encoding="utf-8"?>
+<file path=ppt/slides/slide19.xml><?xml version="1.0" encoding="utf-8"?>
 <p:sld xmlns:a="http://schemas.openxmlformats.org/drawingml/2006/main" xmlns:r="http://schemas.openxmlformats.org/officeDocument/2006/relationships" xmlns:p="http://schemas.openxmlformats.org/presentationml/2006/main">
   <p:cSld>
     <p:spTree>
@@ -4208,6 +5452,1237 @@
 </p:sld>
 </file>
 
+<file path=ppt/slides/slide2.xml><?xml version="1.0" encoding="utf-8"?>
+<p:sld xmlns:a="http://schemas.openxmlformats.org/drawingml/2006/main" xmlns:r="http://schemas.openxmlformats.org/officeDocument/2006/relationships" xmlns:p="http://schemas.openxmlformats.org/presentationml/2006/main">
+  <p:cSld>
+    <p:spTree>
+      <p:nvGrpSpPr>
+        <p:cNvPr id="1" name=""/>
+        <p:cNvGrpSpPr/>
+        <p:nvPr/>
+      </p:nvGrpSpPr>
+      <p:grpSpPr>
+        <a:xfrm>
+          <a:off x="0" y="0"/>
+          <a:ext cx="0" cy="0"/>
+          <a:chOff x="0" y="0"/>
+          <a:chExt cx="0" cy="0"/>
+        </a:xfrm>
+      </p:grpSpPr>
+      <p:sp>
+        <p:nvSpPr>
+          <p:cNvPr id="4" name="Subtitle 2">
+            <a:extLst>
+              <a:ext uri="{FF2B5EF4-FFF2-40B4-BE49-F238E27FC236}">
+                <a16:creationId xmlns:a16="http://schemas.microsoft.com/office/drawing/2014/main" id="{E99F6C7A-3764-4990-827B-B1C97673F66F}"/>
+              </a:ext>
+            </a:extLst>
+          </p:cNvPr>
+          <p:cNvSpPr txBox="1">
+            <a:spLocks/>
+          </p:cNvSpPr>
+          <p:nvPr/>
+        </p:nvSpPr>
+        <p:spPr>
+          <a:xfrm>
+            <a:off x="838200" y="750277"/>
+            <a:ext cx="9144000" cy="1992923"/>
+          </a:xfrm>
+          <a:prstGeom prst="rect">
+            <a:avLst/>
+          </a:prstGeom>
+        </p:spPr>
+        <p:txBody>
+          <a:bodyPr vert="horz" lIns="91440" tIns="45720" rIns="91440" bIns="45720" rtlCol="0">
+            <a:normAutofit/>
+          </a:bodyPr>
+          <a:lstStyle>
+            <a:lvl1pPr marL="228600" indent="-228600" algn="l" defTabSz="914400" rtl="0" eaLnBrk="1" latinLnBrk="0" hangingPunct="1">
+              <a:lnSpc>
+                <a:spcPct val="90000"/>
+              </a:lnSpc>
+              <a:spcBef>
+                <a:spcPts val="1000"/>
+              </a:spcBef>
+              <a:buFont typeface="Arial" panose="020B0604020202020204" pitchFamily="34" charset="0"/>
+              <a:buChar char="•"/>
+              <a:defRPr sz="2800" kern="1200">
+                <a:solidFill>
+                  <a:schemeClr val="tx1"/>
+                </a:solidFill>
+                <a:latin typeface="+mn-lt"/>
+                <a:ea typeface="+mn-ea"/>
+                <a:cs typeface="+mn-cs"/>
+              </a:defRPr>
+            </a:lvl1pPr>
+            <a:lvl2pPr marL="685800" indent="-228600" algn="l" defTabSz="914400" rtl="0" eaLnBrk="1" latinLnBrk="0" hangingPunct="1">
+              <a:lnSpc>
+                <a:spcPct val="90000"/>
+              </a:lnSpc>
+              <a:spcBef>
+                <a:spcPts val="500"/>
+              </a:spcBef>
+              <a:buFont typeface="Arial" panose="020B0604020202020204" pitchFamily="34" charset="0"/>
+              <a:buChar char="•"/>
+              <a:defRPr sz="2400" kern="1200">
+                <a:solidFill>
+                  <a:schemeClr val="tx1"/>
+                </a:solidFill>
+                <a:latin typeface="+mn-lt"/>
+                <a:ea typeface="+mn-ea"/>
+                <a:cs typeface="+mn-cs"/>
+              </a:defRPr>
+            </a:lvl2pPr>
+            <a:lvl3pPr marL="1143000" indent="-228600" algn="l" defTabSz="914400" rtl="0" eaLnBrk="1" latinLnBrk="0" hangingPunct="1">
+              <a:lnSpc>
+                <a:spcPct val="90000"/>
+              </a:lnSpc>
+              <a:spcBef>
+                <a:spcPts val="500"/>
+              </a:spcBef>
+              <a:buFont typeface="Arial" panose="020B0604020202020204" pitchFamily="34" charset="0"/>
+              <a:buChar char="•"/>
+              <a:defRPr sz="2000" kern="1200">
+                <a:solidFill>
+                  <a:schemeClr val="tx1"/>
+                </a:solidFill>
+                <a:latin typeface="+mn-lt"/>
+                <a:ea typeface="+mn-ea"/>
+                <a:cs typeface="+mn-cs"/>
+              </a:defRPr>
+            </a:lvl3pPr>
+            <a:lvl4pPr marL="1600200" indent="-228600" algn="l" defTabSz="914400" rtl="0" eaLnBrk="1" latinLnBrk="0" hangingPunct="1">
+              <a:lnSpc>
+                <a:spcPct val="90000"/>
+              </a:lnSpc>
+              <a:spcBef>
+                <a:spcPts val="500"/>
+              </a:spcBef>
+              <a:buFont typeface="Arial" panose="020B0604020202020204" pitchFamily="34" charset="0"/>
+              <a:buChar char="•"/>
+              <a:defRPr sz="1800" kern="1200">
+                <a:solidFill>
+                  <a:schemeClr val="tx1"/>
+                </a:solidFill>
+                <a:latin typeface="+mn-lt"/>
+                <a:ea typeface="+mn-ea"/>
+                <a:cs typeface="+mn-cs"/>
+              </a:defRPr>
+            </a:lvl4pPr>
+            <a:lvl5pPr marL="2057400" indent="-228600" algn="l" defTabSz="914400" rtl="0" eaLnBrk="1" latinLnBrk="0" hangingPunct="1">
+              <a:lnSpc>
+                <a:spcPct val="90000"/>
+              </a:lnSpc>
+              <a:spcBef>
+                <a:spcPts val="500"/>
+              </a:spcBef>
+              <a:buFont typeface="Arial" panose="020B0604020202020204" pitchFamily="34" charset="0"/>
+              <a:buChar char="•"/>
+              <a:defRPr sz="1800" kern="1200">
+                <a:solidFill>
+                  <a:schemeClr val="tx1"/>
+                </a:solidFill>
+                <a:latin typeface="+mn-lt"/>
+                <a:ea typeface="+mn-ea"/>
+                <a:cs typeface="+mn-cs"/>
+              </a:defRPr>
+            </a:lvl5pPr>
+            <a:lvl6pPr marL="2514600" indent="-228600" algn="l" defTabSz="914400" rtl="0" eaLnBrk="1" latinLnBrk="0" hangingPunct="1">
+              <a:lnSpc>
+                <a:spcPct val="90000"/>
+              </a:lnSpc>
+              <a:spcBef>
+                <a:spcPts val="500"/>
+              </a:spcBef>
+              <a:buFont typeface="Arial" panose="020B0604020202020204" pitchFamily="34" charset="0"/>
+              <a:buChar char="•"/>
+              <a:defRPr sz="1800" kern="1200">
+                <a:solidFill>
+                  <a:schemeClr val="tx1"/>
+                </a:solidFill>
+                <a:latin typeface="+mn-lt"/>
+                <a:ea typeface="+mn-ea"/>
+                <a:cs typeface="+mn-cs"/>
+              </a:defRPr>
+            </a:lvl6pPr>
+            <a:lvl7pPr marL="2971800" indent="-228600" algn="l" defTabSz="914400" rtl="0" eaLnBrk="1" latinLnBrk="0" hangingPunct="1">
+              <a:lnSpc>
+                <a:spcPct val="90000"/>
+              </a:lnSpc>
+              <a:spcBef>
+                <a:spcPts val="500"/>
+              </a:spcBef>
+              <a:buFont typeface="Arial" panose="020B0604020202020204" pitchFamily="34" charset="0"/>
+              <a:buChar char="•"/>
+              <a:defRPr sz="1800" kern="1200">
+                <a:solidFill>
+                  <a:schemeClr val="tx1"/>
+                </a:solidFill>
+                <a:latin typeface="+mn-lt"/>
+                <a:ea typeface="+mn-ea"/>
+                <a:cs typeface="+mn-cs"/>
+              </a:defRPr>
+            </a:lvl7pPr>
+            <a:lvl8pPr marL="3429000" indent="-228600" algn="l" defTabSz="914400" rtl="0" eaLnBrk="1" latinLnBrk="0" hangingPunct="1">
+              <a:lnSpc>
+                <a:spcPct val="90000"/>
+              </a:lnSpc>
+              <a:spcBef>
+                <a:spcPts val="500"/>
+              </a:spcBef>
+              <a:buFont typeface="Arial" panose="020B0604020202020204" pitchFamily="34" charset="0"/>
+              <a:buChar char="•"/>
+              <a:defRPr sz="1800" kern="1200">
+                <a:solidFill>
+                  <a:schemeClr val="tx1"/>
+                </a:solidFill>
+                <a:latin typeface="+mn-lt"/>
+                <a:ea typeface="+mn-ea"/>
+                <a:cs typeface="+mn-cs"/>
+              </a:defRPr>
+            </a:lvl8pPr>
+            <a:lvl9pPr marL="3886200" indent="-228600" algn="l" defTabSz="914400" rtl="0" eaLnBrk="1" latinLnBrk="0" hangingPunct="1">
+              <a:lnSpc>
+                <a:spcPct val="90000"/>
+              </a:lnSpc>
+              <a:spcBef>
+                <a:spcPts val="500"/>
+              </a:spcBef>
+              <a:buFont typeface="Arial" panose="020B0604020202020204" pitchFamily="34" charset="0"/>
+              <a:buChar char="•"/>
+              <a:defRPr sz="1800" kern="1200">
+                <a:solidFill>
+                  <a:schemeClr val="tx1"/>
+                </a:solidFill>
+                <a:latin typeface="+mn-lt"/>
+                <a:ea typeface="+mn-ea"/>
+                <a:cs typeface="+mn-cs"/>
+              </a:defRPr>
+            </a:lvl9pPr>
+          </a:lstStyle>
+          <a:p>
+            <a:pPr marL="0" indent="0">
+              <a:buNone/>
+            </a:pPr>
+            <a:r>
+              <a:rPr lang="en-GB" sz="1500" dirty="0"/>
+              <a:t>Bayesian Result – minVI to obtain point estimates of neuron allocations</a:t>
+            </a:r>
+          </a:p>
+          <a:p>
+            <a:endParaRPr lang="en-GB" dirty="0"/>
+          </a:p>
+          <a:p>
+            <a:pPr marL="0" indent="0">
+              <a:buNone/>
+            </a:pPr>
+            <a:r>
+              <a:rPr lang="en-GB" sz="1500" dirty="0"/>
+              <a:t>There are 148 clusters (motifs) in total:</a:t>
+            </a:r>
+          </a:p>
+        </p:txBody>
+      </p:sp>
+      <p:pic>
+        <p:nvPicPr>
+          <p:cNvPr id="6" name="Picture 5">
+            <a:extLst>
+              <a:ext uri="{FF2B5EF4-FFF2-40B4-BE49-F238E27FC236}">
+                <a16:creationId xmlns:a16="http://schemas.microsoft.com/office/drawing/2014/main" id="{78B593E9-5CAC-4E86-8545-833294C969BD}"/>
+              </a:ext>
+            </a:extLst>
+          </p:cNvPr>
+          <p:cNvPicPr>
+            <a:picLocks noChangeAspect="1"/>
+          </p:cNvPicPr>
+          <p:nvPr/>
+        </p:nvPicPr>
+        <p:blipFill>
+          <a:blip r:embed="rId2">
+            <a:extLst>
+              <a:ext uri="{28A0092B-C50C-407E-A947-70E740481C1C}">
+                <a14:useLocalDpi xmlns:a14="http://schemas.microsoft.com/office/drawing/2010/main" val="0"/>
+              </a:ext>
+            </a:extLst>
+          </a:blip>
+          <a:stretch>
+            <a:fillRect/>
+          </a:stretch>
+        </p:blipFill>
+        <p:spPr>
+          <a:xfrm>
+            <a:off x="0" y="2501016"/>
+            <a:ext cx="12192000" cy="3413760"/>
+          </a:xfrm>
+          <a:prstGeom prst="rect">
+            <a:avLst/>
+          </a:prstGeom>
+        </p:spPr>
+      </p:pic>
+    </p:spTree>
+    <p:extLst>
+      <p:ext uri="{BB962C8B-B14F-4D97-AF65-F5344CB8AC3E}">
+        <p14:creationId xmlns:p14="http://schemas.microsoft.com/office/powerpoint/2010/main" val="3127050744"/>
+      </p:ext>
+    </p:extLst>
+  </p:cSld>
+  <p:clrMapOvr>
+    <a:masterClrMapping/>
+  </p:clrMapOvr>
+</p:sld>
+</file>
+
+<file path=ppt/slides/slide20.xml><?xml version="1.0" encoding="utf-8"?>
+<p:sld xmlns:a="http://schemas.openxmlformats.org/drawingml/2006/main" xmlns:r="http://schemas.openxmlformats.org/officeDocument/2006/relationships" xmlns:p="http://schemas.openxmlformats.org/presentationml/2006/main">
+  <p:cSld>
+    <p:spTree>
+      <p:nvGrpSpPr>
+        <p:cNvPr id="1" name=""/>
+        <p:cNvGrpSpPr/>
+        <p:nvPr/>
+      </p:nvGrpSpPr>
+      <p:grpSpPr>
+        <a:xfrm>
+          <a:off x="0" y="0"/>
+          <a:ext cx="0" cy="0"/>
+          <a:chOff x="0" y="0"/>
+          <a:chExt cx="0" cy="0"/>
+        </a:xfrm>
+      </p:grpSpPr>
+      <p:pic>
+        <p:nvPicPr>
+          <p:cNvPr id="5" name="Picture 4">
+            <a:extLst>
+              <a:ext uri="{FF2B5EF4-FFF2-40B4-BE49-F238E27FC236}">
+                <a16:creationId xmlns:a16="http://schemas.microsoft.com/office/drawing/2014/main" id="{5BF36865-74F3-435D-98EE-88192BEE201D}"/>
+              </a:ext>
+            </a:extLst>
+          </p:cNvPr>
+          <p:cNvPicPr>
+            <a:picLocks noChangeAspect="1"/>
+          </p:cNvPicPr>
+          <p:nvPr/>
+        </p:nvPicPr>
+        <p:blipFill>
+          <a:blip r:embed="rId2">
+            <a:extLst>
+              <a:ext uri="{28A0092B-C50C-407E-A947-70E740481C1C}">
+                <a14:useLocalDpi xmlns:a14="http://schemas.microsoft.com/office/drawing/2010/main" val="0"/>
+              </a:ext>
+            </a:extLst>
+          </a:blip>
+          <a:stretch>
+            <a:fillRect/>
+          </a:stretch>
+        </p:blipFill>
+        <p:spPr>
+          <a:xfrm>
+            <a:off x="2474054" y="998289"/>
+            <a:ext cx="5238925" cy="5238925"/>
+          </a:xfrm>
+          <a:prstGeom prst="rect">
+            <a:avLst/>
+          </a:prstGeom>
+        </p:spPr>
+      </p:pic>
+      <p:sp>
+        <p:nvSpPr>
+          <p:cNvPr id="6" name="TextBox 5">
+            <a:extLst>
+              <a:ext uri="{FF2B5EF4-FFF2-40B4-BE49-F238E27FC236}">
+                <a16:creationId xmlns:a16="http://schemas.microsoft.com/office/drawing/2014/main" id="{A70268C1-601B-45D7-85D9-58177148256B}"/>
+              </a:ext>
+            </a:extLst>
+          </p:cNvPr>
+          <p:cNvSpPr txBox="1"/>
+          <p:nvPr/>
+        </p:nvSpPr>
+        <p:spPr>
+          <a:xfrm>
+            <a:off x="1392573" y="486561"/>
+            <a:ext cx="9068499" cy="369332"/>
+          </a:xfrm>
+          <a:prstGeom prst="rect">
+            <a:avLst/>
+          </a:prstGeom>
+          <a:noFill/>
+        </p:spPr>
+        <p:txBody>
+          <a:bodyPr wrap="square" rtlCol="0">
+            <a:spAutoFit/>
+          </a:bodyPr>
+          <a:lstStyle/>
+          <a:p>
+            <a:r>
+              <a:rPr lang="en-GB" dirty="0"/>
+              <a:t>Heatmap of the Binomial model which detects 367 motifs: </a:t>
+            </a:r>
+          </a:p>
+        </p:txBody>
+      </p:sp>
+    </p:spTree>
+    <p:extLst>
+      <p:ext uri="{BB962C8B-B14F-4D97-AF65-F5344CB8AC3E}">
+        <p14:creationId xmlns:p14="http://schemas.microsoft.com/office/powerpoint/2010/main" val="2972234332"/>
+      </p:ext>
+    </p:extLst>
+  </p:cSld>
+  <p:clrMapOvr>
+    <a:masterClrMapping/>
+  </p:clrMapOvr>
+</p:sld>
+</file>
+
+<file path=ppt/slides/slide21.xml><?xml version="1.0" encoding="utf-8"?>
+<p:sld xmlns:a="http://schemas.openxmlformats.org/drawingml/2006/main" xmlns:r="http://schemas.openxmlformats.org/officeDocument/2006/relationships" xmlns:p="http://schemas.openxmlformats.org/presentationml/2006/main">
+  <p:cSld>
+    <p:spTree>
+      <p:nvGrpSpPr>
+        <p:cNvPr id="1" name=""/>
+        <p:cNvGrpSpPr/>
+        <p:nvPr/>
+      </p:nvGrpSpPr>
+      <p:grpSpPr>
+        <a:xfrm>
+          <a:off x="0" y="0"/>
+          <a:ext cx="0" cy="0"/>
+          <a:chOff x="0" y="0"/>
+          <a:chExt cx="0" cy="0"/>
+        </a:xfrm>
+      </p:grpSpPr>
+      <p:pic>
+        <p:nvPicPr>
+          <p:cNvPr id="5" name="Picture 4">
+            <a:extLst>
+              <a:ext uri="{FF2B5EF4-FFF2-40B4-BE49-F238E27FC236}">
+                <a16:creationId xmlns:a16="http://schemas.microsoft.com/office/drawing/2014/main" id="{EEC8AB54-57AA-4645-BB29-6A1815231F0C}"/>
+              </a:ext>
+            </a:extLst>
+          </p:cNvPr>
+          <p:cNvPicPr>
+            <a:picLocks noChangeAspect="1"/>
+          </p:cNvPicPr>
+          <p:nvPr/>
+        </p:nvPicPr>
+        <p:blipFill>
+          <a:blip r:embed="rId2">
+            <a:extLst>
+              <a:ext uri="{28A0092B-C50C-407E-A947-70E740481C1C}">
+                <a14:useLocalDpi xmlns:a14="http://schemas.microsoft.com/office/drawing/2010/main" val="0"/>
+              </a:ext>
+            </a:extLst>
+          </a:blip>
+          <a:stretch>
+            <a:fillRect/>
+          </a:stretch>
+        </p:blipFill>
+        <p:spPr>
+          <a:xfrm>
+            <a:off x="6003721" y="250795"/>
+            <a:ext cx="4846880" cy="3029300"/>
+          </a:xfrm>
+          <a:prstGeom prst="rect">
+            <a:avLst/>
+          </a:prstGeom>
+        </p:spPr>
+      </p:pic>
+      <p:pic>
+        <p:nvPicPr>
+          <p:cNvPr id="7" name="Picture 6">
+            <a:extLst>
+              <a:ext uri="{FF2B5EF4-FFF2-40B4-BE49-F238E27FC236}">
+                <a16:creationId xmlns:a16="http://schemas.microsoft.com/office/drawing/2014/main" id="{11B8688D-4BC3-4A61-8BCB-8DEDEDC44C51}"/>
+              </a:ext>
+            </a:extLst>
+          </p:cNvPr>
+          <p:cNvPicPr>
+            <a:picLocks noChangeAspect="1"/>
+          </p:cNvPicPr>
+          <p:nvPr/>
+        </p:nvPicPr>
+        <p:blipFill>
+          <a:blip r:embed="rId3">
+            <a:extLst>
+              <a:ext uri="{28A0092B-C50C-407E-A947-70E740481C1C}">
+                <a14:useLocalDpi xmlns:a14="http://schemas.microsoft.com/office/drawing/2010/main" val="0"/>
+              </a:ext>
+            </a:extLst>
+          </a:blip>
+          <a:stretch>
+            <a:fillRect/>
+          </a:stretch>
+        </p:blipFill>
+        <p:spPr>
+          <a:xfrm>
+            <a:off x="669161" y="3577906"/>
+            <a:ext cx="4846880" cy="3029300"/>
+          </a:xfrm>
+          <a:prstGeom prst="rect">
+            <a:avLst/>
+          </a:prstGeom>
+        </p:spPr>
+      </p:pic>
+      <p:pic>
+        <p:nvPicPr>
+          <p:cNvPr id="9" name="Picture 8">
+            <a:extLst>
+              <a:ext uri="{FF2B5EF4-FFF2-40B4-BE49-F238E27FC236}">
+                <a16:creationId xmlns:a16="http://schemas.microsoft.com/office/drawing/2014/main" id="{7F0C17E5-28E2-4314-8D32-6E841CCAA153}"/>
+              </a:ext>
+            </a:extLst>
+          </p:cNvPr>
+          <p:cNvPicPr>
+            <a:picLocks noChangeAspect="1"/>
+          </p:cNvPicPr>
+          <p:nvPr/>
+        </p:nvPicPr>
+        <p:blipFill>
+          <a:blip r:embed="rId4">
+            <a:extLst>
+              <a:ext uri="{28A0092B-C50C-407E-A947-70E740481C1C}">
+                <a14:useLocalDpi xmlns:a14="http://schemas.microsoft.com/office/drawing/2010/main" val="0"/>
+              </a:ext>
+            </a:extLst>
+          </a:blip>
+          <a:stretch>
+            <a:fillRect/>
+          </a:stretch>
+        </p:blipFill>
+        <p:spPr>
+          <a:xfrm>
+            <a:off x="6003721" y="3577906"/>
+            <a:ext cx="4846880" cy="3029300"/>
+          </a:xfrm>
+          <a:prstGeom prst="rect">
+            <a:avLst/>
+          </a:prstGeom>
+        </p:spPr>
+      </p:pic>
+      <p:sp>
+        <p:nvSpPr>
+          <p:cNvPr id="10" name="TextBox 9">
+            <a:extLst>
+              <a:ext uri="{FF2B5EF4-FFF2-40B4-BE49-F238E27FC236}">
+                <a16:creationId xmlns:a16="http://schemas.microsoft.com/office/drawing/2014/main" id="{11BD8063-13A6-4A85-93D3-578FE5745752}"/>
+              </a:ext>
+            </a:extLst>
+          </p:cNvPr>
+          <p:cNvSpPr txBox="1"/>
+          <p:nvPr/>
+        </p:nvSpPr>
+        <p:spPr>
+          <a:xfrm>
+            <a:off x="1046666" y="472783"/>
+            <a:ext cx="3212983" cy="2585323"/>
+          </a:xfrm>
+          <a:prstGeom prst="rect">
+            <a:avLst/>
+          </a:prstGeom>
+          <a:noFill/>
+        </p:spPr>
+        <p:txBody>
+          <a:bodyPr wrap="square" rtlCol="0">
+            <a:spAutoFit/>
+          </a:bodyPr>
+          <a:lstStyle/>
+          <a:p>
+            <a:r>
+              <a:rPr lang="en-GB" dirty="0"/>
+              <a:t>For some of the large Bayesian motifs, we present the projection strengths of each neuron to each region, color-coded by the corresponding Binomial allocations. There are seven motifs identified by the Bayesian model with more than 100 allocated neurons.</a:t>
+            </a:r>
+          </a:p>
+        </p:txBody>
+      </p:sp>
+    </p:spTree>
+    <p:extLst>
+      <p:ext uri="{BB962C8B-B14F-4D97-AF65-F5344CB8AC3E}">
+        <p14:creationId xmlns:p14="http://schemas.microsoft.com/office/powerpoint/2010/main" val="3839730089"/>
+      </p:ext>
+    </p:extLst>
+  </p:cSld>
+  <p:clrMapOvr>
+    <a:masterClrMapping/>
+  </p:clrMapOvr>
+</p:sld>
+</file>
+
+<file path=ppt/slides/slide22.xml><?xml version="1.0" encoding="utf-8"?>
+<p:sld xmlns:a="http://schemas.openxmlformats.org/drawingml/2006/main" xmlns:r="http://schemas.openxmlformats.org/officeDocument/2006/relationships" xmlns:p="http://schemas.openxmlformats.org/presentationml/2006/main">
+  <p:cSld>
+    <p:spTree>
+      <p:nvGrpSpPr>
+        <p:cNvPr id="1" name=""/>
+        <p:cNvGrpSpPr/>
+        <p:nvPr/>
+      </p:nvGrpSpPr>
+      <p:grpSpPr>
+        <a:xfrm>
+          <a:off x="0" y="0"/>
+          <a:ext cx="0" cy="0"/>
+          <a:chOff x="0" y="0"/>
+          <a:chExt cx="0" cy="0"/>
+        </a:xfrm>
+      </p:grpSpPr>
+      <p:sp>
+        <p:nvSpPr>
+          <p:cNvPr id="4" name="TextBox 3">
+            <a:extLst>
+              <a:ext uri="{FF2B5EF4-FFF2-40B4-BE49-F238E27FC236}">
+                <a16:creationId xmlns:a16="http://schemas.microsoft.com/office/drawing/2014/main" id="{81C4C251-7FB9-43E5-8833-0E24CC9B0DBF}"/>
+              </a:ext>
+            </a:extLst>
+          </p:cNvPr>
+          <p:cNvSpPr txBox="1"/>
+          <p:nvPr/>
+        </p:nvSpPr>
+        <p:spPr>
+          <a:xfrm>
+            <a:off x="1046666" y="472783"/>
+            <a:ext cx="3212983" cy="2585323"/>
+          </a:xfrm>
+          <a:prstGeom prst="rect">
+            <a:avLst/>
+          </a:prstGeom>
+          <a:noFill/>
+        </p:spPr>
+        <p:txBody>
+          <a:bodyPr wrap="square" rtlCol="0">
+            <a:spAutoFit/>
+          </a:bodyPr>
+          <a:lstStyle/>
+          <a:p>
+            <a:r>
+              <a:rPr lang="en-GB" dirty="0"/>
+              <a:t>For some of the large Binomial motifs, we present the projection strengths of each neuron to each region, color-coded by the corresponding Bayesian allocations. There are ten motifs identified by the Binomial model with more than 100 allocated neurons.</a:t>
+            </a:r>
+          </a:p>
+        </p:txBody>
+      </p:sp>
+      <p:pic>
+        <p:nvPicPr>
+          <p:cNvPr id="6" name="Picture 5">
+            <a:extLst>
+              <a:ext uri="{FF2B5EF4-FFF2-40B4-BE49-F238E27FC236}">
+                <a16:creationId xmlns:a16="http://schemas.microsoft.com/office/drawing/2014/main" id="{090B5578-DB3B-4930-B24D-0483BF8F2906}"/>
+              </a:ext>
+            </a:extLst>
+          </p:cNvPr>
+          <p:cNvPicPr>
+            <a:picLocks noChangeAspect="1"/>
+          </p:cNvPicPr>
+          <p:nvPr/>
+        </p:nvPicPr>
+        <p:blipFill>
+          <a:blip r:embed="rId2">
+            <a:extLst>
+              <a:ext uri="{28A0092B-C50C-407E-A947-70E740481C1C}">
+                <a14:useLocalDpi xmlns:a14="http://schemas.microsoft.com/office/drawing/2010/main" val="0"/>
+              </a:ext>
+            </a:extLst>
+          </a:blip>
+          <a:stretch>
+            <a:fillRect/>
+          </a:stretch>
+        </p:blipFill>
+        <p:spPr>
+          <a:xfrm>
+            <a:off x="969948" y="3429000"/>
+            <a:ext cx="4613304" cy="2883315"/>
+          </a:xfrm>
+          <a:prstGeom prst="rect">
+            <a:avLst/>
+          </a:prstGeom>
+        </p:spPr>
+      </p:pic>
+      <p:pic>
+        <p:nvPicPr>
+          <p:cNvPr id="8" name="Picture 7">
+            <a:extLst>
+              <a:ext uri="{FF2B5EF4-FFF2-40B4-BE49-F238E27FC236}">
+                <a16:creationId xmlns:a16="http://schemas.microsoft.com/office/drawing/2014/main" id="{36311B2B-EE14-4BE2-A4AE-E3EDA8E1F2DB}"/>
+              </a:ext>
+            </a:extLst>
+          </p:cNvPr>
+          <p:cNvPicPr>
+            <a:picLocks noChangeAspect="1"/>
+          </p:cNvPicPr>
+          <p:nvPr/>
+        </p:nvPicPr>
+        <p:blipFill>
+          <a:blip r:embed="rId3">
+            <a:extLst>
+              <a:ext uri="{28A0092B-C50C-407E-A947-70E740481C1C}">
+                <a14:useLocalDpi xmlns:a14="http://schemas.microsoft.com/office/drawing/2010/main" val="0"/>
+              </a:ext>
+            </a:extLst>
+          </a:blip>
+          <a:stretch>
+            <a:fillRect/>
+          </a:stretch>
+        </p:blipFill>
+        <p:spPr>
+          <a:xfrm>
+            <a:off x="6398880" y="3607347"/>
+            <a:ext cx="4898659" cy="3061662"/>
+          </a:xfrm>
+          <a:prstGeom prst="rect">
+            <a:avLst/>
+          </a:prstGeom>
+        </p:spPr>
+      </p:pic>
+      <p:pic>
+        <p:nvPicPr>
+          <p:cNvPr id="10" name="Picture 9">
+            <a:extLst>
+              <a:ext uri="{FF2B5EF4-FFF2-40B4-BE49-F238E27FC236}">
+                <a16:creationId xmlns:a16="http://schemas.microsoft.com/office/drawing/2014/main" id="{05050717-B242-4178-94D9-2D0004FD7D83}"/>
+              </a:ext>
+            </a:extLst>
+          </p:cNvPr>
+          <p:cNvPicPr>
+            <a:picLocks noChangeAspect="1"/>
+          </p:cNvPicPr>
+          <p:nvPr/>
+        </p:nvPicPr>
+        <p:blipFill>
+          <a:blip r:embed="rId4">
+            <a:extLst>
+              <a:ext uri="{28A0092B-C50C-407E-A947-70E740481C1C}">
+                <a14:useLocalDpi xmlns:a14="http://schemas.microsoft.com/office/drawing/2010/main" val="0"/>
+              </a:ext>
+            </a:extLst>
+          </a:blip>
+          <a:stretch>
+            <a:fillRect/>
+          </a:stretch>
+        </p:blipFill>
+        <p:spPr>
+          <a:xfrm>
+            <a:off x="6398881" y="367338"/>
+            <a:ext cx="4898660" cy="3061662"/>
+          </a:xfrm>
+          <a:prstGeom prst="rect">
+            <a:avLst/>
+          </a:prstGeom>
+        </p:spPr>
+      </p:pic>
+    </p:spTree>
+    <p:extLst>
+      <p:ext uri="{BB962C8B-B14F-4D97-AF65-F5344CB8AC3E}">
+        <p14:creationId xmlns:p14="http://schemas.microsoft.com/office/powerpoint/2010/main" val="1982032632"/>
+      </p:ext>
+    </p:extLst>
+  </p:cSld>
+  <p:clrMapOvr>
+    <a:masterClrMapping/>
+  </p:clrMapOvr>
+</p:sld>
+</file>
+
+<file path=ppt/slides/slide23.xml><?xml version="1.0" encoding="utf-8"?>
+<p:sld xmlns:a="http://schemas.openxmlformats.org/drawingml/2006/main" xmlns:r="http://schemas.openxmlformats.org/officeDocument/2006/relationships" xmlns:p="http://schemas.openxmlformats.org/presentationml/2006/main">
+  <p:cSld>
+    <p:spTree>
+      <p:nvGrpSpPr>
+        <p:cNvPr id="1" name=""/>
+        <p:cNvGrpSpPr/>
+        <p:nvPr/>
+      </p:nvGrpSpPr>
+      <p:grpSpPr>
+        <a:xfrm>
+          <a:off x="0" y="0"/>
+          <a:ext cx="0" cy="0"/>
+          <a:chOff x="0" y="0"/>
+          <a:chExt cx="0" cy="0"/>
+        </a:xfrm>
+      </p:grpSpPr>
+      <p:sp>
+        <p:nvSpPr>
+          <p:cNvPr id="2" name="Title 1">
+            <a:extLst>
+              <a:ext uri="{FF2B5EF4-FFF2-40B4-BE49-F238E27FC236}">
+                <a16:creationId xmlns:a16="http://schemas.microsoft.com/office/drawing/2014/main" id="{A7F84956-1E86-4F39-B8B7-EB55C3975013}"/>
+              </a:ext>
+            </a:extLst>
+          </p:cNvPr>
+          <p:cNvSpPr>
+            <a:spLocks noGrp="1"/>
+          </p:cNvSpPr>
+          <p:nvPr>
+            <p:ph type="title"/>
+          </p:nvPr>
+        </p:nvSpPr>
+        <p:spPr/>
+        <p:txBody>
+          <a:bodyPr>
+            <a:normAutofit/>
+          </a:bodyPr>
+          <a:lstStyle/>
+          <a:p>
+            <a:r>
+              <a:rPr lang="en-GB" sz="2000" dirty="0"/>
+              <a:t>Comparison of cluster estimates using VI (values shown are standardized to range [0,1])</a:t>
+            </a:r>
+          </a:p>
+        </p:txBody>
+      </p:sp>
+      <p:pic>
+        <p:nvPicPr>
+          <p:cNvPr id="5" name="Content Placeholder 4">
+            <a:extLst>
+              <a:ext uri="{FF2B5EF4-FFF2-40B4-BE49-F238E27FC236}">
+                <a16:creationId xmlns:a16="http://schemas.microsoft.com/office/drawing/2014/main" id="{341F9615-FC71-48EA-A015-0FBC684FEC72}"/>
+              </a:ext>
+            </a:extLst>
+          </p:cNvPr>
+          <p:cNvPicPr>
+            <a:picLocks noGrp="1" noChangeAspect="1"/>
+          </p:cNvPicPr>
+          <p:nvPr>
+            <p:ph idx="1"/>
+          </p:nvPr>
+        </p:nvPicPr>
+        <p:blipFill>
+          <a:blip r:embed="rId2">
+            <a:extLst>
+              <a:ext uri="{28A0092B-C50C-407E-A947-70E740481C1C}">
+                <a14:useLocalDpi xmlns:a14="http://schemas.microsoft.com/office/drawing/2010/main" val="0"/>
+              </a:ext>
+            </a:extLst>
+          </a:blip>
+          <a:stretch>
+            <a:fillRect/>
+          </a:stretch>
+        </p:blipFill>
+        <p:spPr>
+          <a:xfrm>
+            <a:off x="838200" y="2395662"/>
+            <a:ext cx="5430008" cy="828791"/>
+          </a:xfrm>
+        </p:spPr>
+      </p:pic>
+    </p:spTree>
+    <p:extLst>
+      <p:ext uri="{BB962C8B-B14F-4D97-AF65-F5344CB8AC3E}">
+        <p14:creationId xmlns:p14="http://schemas.microsoft.com/office/powerpoint/2010/main" val="1122796300"/>
+      </p:ext>
+    </p:extLst>
+  </p:cSld>
+  <p:clrMapOvr>
+    <a:masterClrMapping/>
+  </p:clrMapOvr>
+</p:sld>
+</file>
+
+<file path=ppt/slides/slide3.xml><?xml version="1.0" encoding="utf-8"?>
+<p:sld xmlns:a="http://schemas.openxmlformats.org/drawingml/2006/main" xmlns:r="http://schemas.openxmlformats.org/officeDocument/2006/relationships" xmlns:p="http://schemas.openxmlformats.org/presentationml/2006/main">
+  <p:cSld>
+    <p:spTree>
+      <p:nvGrpSpPr>
+        <p:cNvPr id="1" name=""/>
+        <p:cNvGrpSpPr/>
+        <p:nvPr/>
+      </p:nvGrpSpPr>
+      <p:grpSpPr>
+        <a:xfrm>
+          <a:off x="0" y="0"/>
+          <a:ext cx="0" cy="0"/>
+          <a:chOff x="0" y="0"/>
+          <a:chExt cx="0" cy="0"/>
+        </a:xfrm>
+      </p:grpSpPr>
+      <p:sp>
+        <p:nvSpPr>
+          <p:cNvPr id="2" name="Title 1">
+            <a:extLst>
+              <a:ext uri="{FF2B5EF4-FFF2-40B4-BE49-F238E27FC236}">
+                <a16:creationId xmlns:a16="http://schemas.microsoft.com/office/drawing/2014/main" id="{FD880C78-AB8C-442F-8D57-67486738F907}"/>
+              </a:ext>
+            </a:extLst>
+          </p:cNvPr>
+          <p:cNvSpPr>
+            <a:spLocks noGrp="1"/>
+          </p:cNvSpPr>
+          <p:nvPr>
+            <p:ph type="title"/>
+          </p:nvPr>
+        </p:nvSpPr>
+        <p:spPr>
+          <a:xfrm>
+            <a:off x="838200" y="365125"/>
+            <a:ext cx="10515600" cy="800945"/>
+          </a:xfrm>
+        </p:spPr>
+        <p:txBody>
+          <a:bodyPr>
+            <a:normAutofit/>
+          </a:bodyPr>
+          <a:lstStyle/>
+          <a:p>
+            <a:r>
+              <a:rPr lang="en-GB" sz="1500" dirty="0"/>
+              <a:t>Total number of LEC and MEC neurons in each cluster:</a:t>
+            </a:r>
+          </a:p>
+        </p:txBody>
+      </p:sp>
+      <p:pic>
+        <p:nvPicPr>
+          <p:cNvPr id="5" name="Content Placeholder 4">
+            <a:extLst>
+              <a:ext uri="{FF2B5EF4-FFF2-40B4-BE49-F238E27FC236}">
+                <a16:creationId xmlns:a16="http://schemas.microsoft.com/office/drawing/2014/main" id="{25FFD113-E8BE-4CF3-B972-7630F4CEDD9E}"/>
+              </a:ext>
+            </a:extLst>
+          </p:cNvPr>
+          <p:cNvPicPr>
+            <a:picLocks noGrp="1" noChangeAspect="1"/>
+          </p:cNvPicPr>
+          <p:nvPr>
+            <p:ph idx="1"/>
+          </p:nvPr>
+        </p:nvPicPr>
+        <p:blipFill>
+          <a:blip r:embed="rId2">
+            <a:extLst>
+              <a:ext uri="{28A0092B-C50C-407E-A947-70E740481C1C}">
+                <a14:useLocalDpi xmlns:a14="http://schemas.microsoft.com/office/drawing/2010/main" val="0"/>
+              </a:ext>
+            </a:extLst>
+          </a:blip>
+          <a:stretch>
+            <a:fillRect/>
+          </a:stretch>
+        </p:blipFill>
+        <p:spPr>
+          <a:xfrm>
+            <a:off x="242580" y="1857871"/>
+            <a:ext cx="11730643" cy="3284580"/>
+          </a:xfrm>
+        </p:spPr>
+      </p:pic>
+    </p:spTree>
+    <p:extLst>
+      <p:ext uri="{BB962C8B-B14F-4D97-AF65-F5344CB8AC3E}">
+        <p14:creationId xmlns:p14="http://schemas.microsoft.com/office/powerpoint/2010/main" val="635113151"/>
+      </p:ext>
+    </p:extLst>
+  </p:cSld>
+  <p:clrMapOvr>
+    <a:masterClrMapping/>
+  </p:clrMapOvr>
+</p:sld>
+</file>
+
+<file path=ppt/slides/slide4.xml><?xml version="1.0" encoding="utf-8"?>
+<p:sld xmlns:a="http://schemas.openxmlformats.org/drawingml/2006/main" xmlns:r="http://schemas.openxmlformats.org/officeDocument/2006/relationships" xmlns:p="http://schemas.openxmlformats.org/presentationml/2006/main">
+  <p:cSld>
+    <p:spTree>
+      <p:nvGrpSpPr>
+        <p:cNvPr id="1" name=""/>
+        <p:cNvGrpSpPr/>
+        <p:nvPr/>
+      </p:nvGrpSpPr>
+      <p:grpSpPr>
+        <a:xfrm>
+          <a:off x="0" y="0"/>
+          <a:ext cx="0" cy="0"/>
+          <a:chOff x="0" y="0"/>
+          <a:chExt cx="0" cy="0"/>
+        </a:xfrm>
+      </p:grpSpPr>
+      <p:sp>
+        <p:nvSpPr>
+          <p:cNvPr id="2" name="Title 1">
+            <a:extLst>
+              <a:ext uri="{FF2B5EF4-FFF2-40B4-BE49-F238E27FC236}">
+                <a16:creationId xmlns:a16="http://schemas.microsoft.com/office/drawing/2014/main" id="{4B431FC6-1982-4A14-924A-EACF64E30FA2}"/>
+              </a:ext>
+            </a:extLst>
+          </p:cNvPr>
+          <p:cNvSpPr>
+            <a:spLocks noGrp="1"/>
+          </p:cNvSpPr>
+          <p:nvPr>
+            <p:ph type="title"/>
+          </p:nvPr>
+        </p:nvSpPr>
+        <p:spPr>
+          <a:xfrm>
+            <a:off x="838200" y="365125"/>
+            <a:ext cx="10515600" cy="817723"/>
+          </a:xfrm>
+        </p:spPr>
+        <p:txBody>
+          <a:bodyPr>
+            <a:normAutofit/>
+          </a:bodyPr>
+          <a:lstStyle/>
+          <a:p>
+            <a:r>
+              <a:rPr lang="en-GB" sz="1500" dirty="0"/>
+              <a:t>Proportion of LEC and MEC neurons in each cluster:</a:t>
+            </a:r>
+          </a:p>
+        </p:txBody>
+      </p:sp>
+      <p:pic>
+        <p:nvPicPr>
+          <p:cNvPr id="5" name="Picture 4">
+            <a:extLst>
+              <a:ext uri="{FF2B5EF4-FFF2-40B4-BE49-F238E27FC236}">
+                <a16:creationId xmlns:a16="http://schemas.microsoft.com/office/drawing/2014/main" id="{320BF028-A481-4CAF-A108-D1CAA34E8771}"/>
+              </a:ext>
+            </a:extLst>
+          </p:cNvPr>
+          <p:cNvPicPr>
+            <a:picLocks noChangeAspect="1"/>
+          </p:cNvPicPr>
+          <p:nvPr/>
+        </p:nvPicPr>
+        <p:blipFill>
+          <a:blip r:embed="rId2">
+            <a:extLst>
+              <a:ext uri="{28A0092B-C50C-407E-A947-70E740481C1C}">
+                <a14:useLocalDpi xmlns:a14="http://schemas.microsoft.com/office/drawing/2010/main" val="0"/>
+              </a:ext>
+            </a:extLst>
+          </a:blip>
+          <a:stretch>
+            <a:fillRect/>
+          </a:stretch>
+        </p:blipFill>
+        <p:spPr>
+          <a:xfrm>
+            <a:off x="0" y="2175125"/>
+            <a:ext cx="12192000" cy="3413760"/>
+          </a:xfrm>
+          <a:prstGeom prst="rect">
+            <a:avLst/>
+          </a:prstGeom>
+        </p:spPr>
+      </p:pic>
+    </p:spTree>
+    <p:extLst>
+      <p:ext uri="{BB962C8B-B14F-4D97-AF65-F5344CB8AC3E}">
+        <p14:creationId xmlns:p14="http://schemas.microsoft.com/office/powerpoint/2010/main" val="4247004911"/>
+      </p:ext>
+    </p:extLst>
+  </p:cSld>
+  <p:clrMapOvr>
+    <a:masterClrMapping/>
+  </p:clrMapOvr>
+</p:sld>
+</file>
+
+<file path=ppt/slides/slide5.xml><?xml version="1.0" encoding="utf-8"?>
+<p:sld xmlns:a="http://schemas.openxmlformats.org/drawingml/2006/main" xmlns:r="http://schemas.openxmlformats.org/officeDocument/2006/relationships" xmlns:p="http://schemas.openxmlformats.org/presentationml/2006/main">
+  <p:cSld>
+    <p:spTree>
+      <p:nvGrpSpPr>
+        <p:cNvPr id="1" name=""/>
+        <p:cNvGrpSpPr/>
+        <p:nvPr/>
+      </p:nvGrpSpPr>
+      <p:grpSpPr>
+        <a:xfrm>
+          <a:off x="0" y="0"/>
+          <a:ext cx="0" cy="0"/>
+          <a:chOff x="0" y="0"/>
+          <a:chExt cx="0" cy="0"/>
+        </a:xfrm>
+      </p:grpSpPr>
+      <p:sp>
+        <p:nvSpPr>
+          <p:cNvPr id="4" name="TextBox 3">
+            <a:extLst>
+              <a:ext uri="{FF2B5EF4-FFF2-40B4-BE49-F238E27FC236}">
+                <a16:creationId xmlns:a16="http://schemas.microsoft.com/office/drawing/2014/main" id="{3C8FD198-E4AA-4BF6-A7A3-03C048155661}"/>
+              </a:ext>
+            </a:extLst>
+          </p:cNvPr>
+          <p:cNvSpPr txBox="1"/>
+          <p:nvPr/>
+        </p:nvSpPr>
+        <p:spPr>
+          <a:xfrm>
+            <a:off x="535280" y="42193"/>
+            <a:ext cx="11121440" cy="323165"/>
+          </a:xfrm>
+          <a:prstGeom prst="rect">
+            <a:avLst/>
+          </a:prstGeom>
+          <a:noFill/>
+        </p:spPr>
+        <p:txBody>
+          <a:bodyPr wrap="square">
+            <a:spAutoFit/>
+          </a:bodyPr>
+          <a:lstStyle/>
+          <a:p>
+            <a:pPr marL="0" indent="0">
+              <a:buNone/>
+            </a:pPr>
+            <a:r>
+              <a:rPr lang="en-GB" sz="1500" dirty="0"/>
+              <a:t>Estimated projection probability of neurons in each cluster with error-bars, color-coded by the number of projecting regions of each cluster:</a:t>
+            </a:r>
+          </a:p>
+        </p:txBody>
+      </p:sp>
+      <p:pic>
+        <p:nvPicPr>
+          <p:cNvPr id="6" name="Picture 5">
+            <a:extLst>
+              <a:ext uri="{FF2B5EF4-FFF2-40B4-BE49-F238E27FC236}">
+                <a16:creationId xmlns:a16="http://schemas.microsoft.com/office/drawing/2014/main" id="{9814D9B9-52F8-425B-A6B3-321FE3E06ED1}"/>
+              </a:ext>
+            </a:extLst>
+          </p:cNvPr>
+          <p:cNvPicPr>
+            <a:picLocks noChangeAspect="1"/>
+          </p:cNvPicPr>
+          <p:nvPr/>
+        </p:nvPicPr>
+        <p:blipFill>
+          <a:blip r:embed="rId2">
+            <a:extLst>
+              <a:ext uri="{28A0092B-C50C-407E-A947-70E740481C1C}">
+                <a14:useLocalDpi xmlns:a14="http://schemas.microsoft.com/office/drawing/2010/main" val="0"/>
+              </a:ext>
+            </a:extLst>
+          </a:blip>
+          <a:stretch>
+            <a:fillRect/>
+          </a:stretch>
+        </p:blipFill>
+        <p:spPr>
+          <a:xfrm>
+            <a:off x="443901" y="356265"/>
+            <a:ext cx="11304198" cy="6459542"/>
+          </a:xfrm>
+          <a:prstGeom prst="rect">
+            <a:avLst/>
+          </a:prstGeom>
+        </p:spPr>
+      </p:pic>
+    </p:spTree>
+    <p:extLst>
+      <p:ext uri="{BB962C8B-B14F-4D97-AF65-F5344CB8AC3E}">
+        <p14:creationId xmlns:p14="http://schemas.microsoft.com/office/powerpoint/2010/main" val="4292392164"/>
+      </p:ext>
+    </p:extLst>
+  </p:cSld>
+  <p:clrMapOvr>
+    <a:masterClrMapping/>
+  </p:clrMapOvr>
+</p:sld>
+</file>
+
+<file path=ppt/slides/slide6.xml><?xml version="1.0" encoding="utf-8"?>
+<p:sld xmlns:a="http://schemas.openxmlformats.org/drawingml/2006/main" xmlns:r="http://schemas.openxmlformats.org/officeDocument/2006/relationships" xmlns:p="http://schemas.openxmlformats.org/presentationml/2006/main">
+  <p:cSld>
+    <p:spTree>
+      <p:nvGrpSpPr>
+        <p:cNvPr id="1" name=""/>
+        <p:cNvGrpSpPr/>
+        <p:nvPr/>
+      </p:nvGrpSpPr>
+      <p:grpSpPr>
+        <a:xfrm>
+          <a:off x="0" y="0"/>
+          <a:ext cx="0" cy="0"/>
+          <a:chOff x="0" y="0"/>
+          <a:chExt cx="0" cy="0"/>
+        </a:xfrm>
+      </p:grpSpPr>
+      <p:pic>
+        <p:nvPicPr>
+          <p:cNvPr id="5" name="Picture 4">
+            <a:extLst>
+              <a:ext uri="{FF2B5EF4-FFF2-40B4-BE49-F238E27FC236}">
+                <a16:creationId xmlns:a16="http://schemas.microsoft.com/office/drawing/2014/main" id="{F98380BA-4684-428D-97C7-49F7D57D557A}"/>
+              </a:ext>
+            </a:extLst>
+          </p:cNvPr>
+          <p:cNvPicPr>
+            <a:picLocks noChangeAspect="1"/>
+          </p:cNvPicPr>
+          <p:nvPr/>
+        </p:nvPicPr>
+        <p:blipFill>
+          <a:blip r:embed="rId2">
+            <a:extLst>
+              <a:ext uri="{28A0092B-C50C-407E-A947-70E740481C1C}">
+                <a14:useLocalDpi xmlns:a14="http://schemas.microsoft.com/office/drawing/2010/main" val="0"/>
+              </a:ext>
+            </a:extLst>
+          </a:blip>
+          <a:stretch>
+            <a:fillRect/>
+          </a:stretch>
+        </p:blipFill>
+        <p:spPr>
+          <a:xfrm>
+            <a:off x="408264" y="512288"/>
+            <a:ext cx="11537659" cy="6345712"/>
+          </a:xfrm>
+          <a:prstGeom prst="rect">
+            <a:avLst/>
+          </a:prstGeom>
+        </p:spPr>
+      </p:pic>
+      <p:sp>
+        <p:nvSpPr>
+          <p:cNvPr id="6" name="TextBox 5">
+            <a:extLst>
+              <a:ext uri="{FF2B5EF4-FFF2-40B4-BE49-F238E27FC236}">
+                <a16:creationId xmlns:a16="http://schemas.microsoft.com/office/drawing/2014/main" id="{44769953-758F-4193-9D52-4B8866DFCF54}"/>
+              </a:ext>
+            </a:extLst>
+          </p:cNvPr>
+          <p:cNvSpPr txBox="1"/>
+          <p:nvPr/>
+        </p:nvSpPr>
+        <p:spPr>
+          <a:xfrm>
+            <a:off x="535280" y="100916"/>
+            <a:ext cx="11121440" cy="323165"/>
+          </a:xfrm>
+          <a:prstGeom prst="rect">
+            <a:avLst/>
+          </a:prstGeom>
+          <a:noFill/>
+        </p:spPr>
+        <p:txBody>
+          <a:bodyPr wrap="square">
+            <a:spAutoFit/>
+          </a:bodyPr>
+          <a:lstStyle/>
+          <a:p>
+            <a:pPr marL="0" indent="0">
+              <a:buNone/>
+            </a:pPr>
+            <a:r>
+              <a:rPr lang="en-GB" sz="1500" dirty="0"/>
+              <a:t>Projection probabilities of neurons in each cluster, color-coded by the EC:</a:t>
+            </a:r>
+          </a:p>
+        </p:txBody>
+      </p:sp>
+    </p:spTree>
+    <p:extLst>
+      <p:ext uri="{BB962C8B-B14F-4D97-AF65-F5344CB8AC3E}">
+        <p14:creationId xmlns:p14="http://schemas.microsoft.com/office/powerpoint/2010/main" val="2570465643"/>
+      </p:ext>
+    </p:extLst>
+  </p:cSld>
+  <p:clrMapOvr>
+    <a:masterClrMapping/>
+  </p:clrMapOvr>
+</p:sld>
+</file>
+
 <file path=ppt/slides/slide7.xml><?xml version="1.0" encoding="utf-8"?>
 <p:sld xmlns:a="http://schemas.openxmlformats.org/drawingml/2006/main" xmlns:r="http://schemas.openxmlformats.org/officeDocument/2006/relationships" xmlns:p="http://schemas.openxmlformats.org/presentationml/2006/main">
   <p:cSld>
@@ -4230,7 +6705,7 @@
           <p:cNvPr id="2" name="Title 1">
             <a:extLst>
               <a:ext uri="{FF2B5EF4-FFF2-40B4-BE49-F238E27FC236}">
-                <a16:creationId xmlns:a16="http://schemas.microsoft.com/office/drawing/2014/main" id="{B21D329F-2AD4-453C-97F6-1611C85C310A}"/>
+                <a16:creationId xmlns:a16="http://schemas.microsoft.com/office/drawing/2014/main" id="{EC65BAF8-884C-466D-9CB6-808E88B36365}"/>
               </a:ext>
             </a:extLst>
           </p:cNvPr>
@@ -4241,44 +6716,305 @@
             <p:ph type="title"/>
           </p:nvPr>
         </p:nvSpPr>
-        <p:spPr/>
-        <p:txBody>
-          <a:bodyPr/>
+        <p:spPr>
+          <a:xfrm>
+            <a:off x="838200" y="365125"/>
+            <a:ext cx="10515600" cy="1027447"/>
+          </a:xfrm>
+        </p:spPr>
+        <p:txBody>
+          <a:bodyPr>
+            <a:normAutofit/>
+          </a:bodyPr>
           <a:lstStyle/>
           <a:p>
-            <a:endParaRPr lang="en-GB"/>
-          </a:p>
-        </p:txBody>
-      </p:sp>
-      <p:sp>
-        <p:nvSpPr>
-          <p:cNvPr id="3" name="Content Placeholder 2">
-            <a:extLst>
-              <a:ext uri="{FF2B5EF4-FFF2-40B4-BE49-F238E27FC236}">
-                <a16:creationId xmlns:a16="http://schemas.microsoft.com/office/drawing/2014/main" id="{E5B2B806-A1B4-4755-A186-8959270A86FE}"/>
-              </a:ext>
-            </a:extLst>
-          </p:cNvPr>
-          <p:cNvSpPr>
-            <a:spLocks noGrp="1"/>
-          </p:cNvSpPr>
-          <p:nvPr>
-            <p:ph idx="1"/>
-          </p:nvPr>
-        </p:nvSpPr>
-        <p:spPr/>
-        <p:txBody>
-          <a:bodyPr/>
-          <a:lstStyle/>
-          <a:p>
-            <a:endParaRPr lang="en-GB"/>
-          </a:p>
-        </p:txBody>
-      </p:sp>
+            <a:r>
+              <a:rPr lang="en-GB" sz="1500" dirty="0"/>
+              <a:t>Heatmap of posterior similarity matrix: (right) distinguishes between neurons from different mice; visually there are three large clusters.</a:t>
+            </a:r>
+          </a:p>
+        </p:txBody>
+      </p:sp>
+      <p:pic>
+        <p:nvPicPr>
+          <p:cNvPr id="5" name="Picture 4">
+            <a:extLst>
+              <a:ext uri="{FF2B5EF4-FFF2-40B4-BE49-F238E27FC236}">
+                <a16:creationId xmlns:a16="http://schemas.microsoft.com/office/drawing/2014/main" id="{2DA993CA-2A38-4ACD-8147-09FDBA50662B}"/>
+              </a:ext>
+            </a:extLst>
+          </p:cNvPr>
+          <p:cNvPicPr>
+            <a:picLocks noChangeAspect="1"/>
+          </p:cNvPicPr>
+          <p:nvPr/>
+        </p:nvPicPr>
+        <p:blipFill>
+          <a:blip r:embed="rId2">
+            <a:extLst>
+              <a:ext uri="{28A0092B-C50C-407E-A947-70E740481C1C}">
+                <a14:useLocalDpi xmlns:a14="http://schemas.microsoft.com/office/drawing/2010/main" val="0"/>
+              </a:ext>
+            </a:extLst>
+          </a:blip>
+          <a:stretch>
+            <a:fillRect/>
+          </a:stretch>
+        </p:blipFill>
+        <p:spPr>
+          <a:xfrm>
+            <a:off x="6163112" y="1578178"/>
+            <a:ext cx="4572000" cy="4572000"/>
+          </a:xfrm>
+          <a:prstGeom prst="rect">
+            <a:avLst/>
+          </a:prstGeom>
+        </p:spPr>
+      </p:pic>
+      <p:pic>
+        <p:nvPicPr>
+          <p:cNvPr id="7" name="Picture 6">
+            <a:extLst>
+              <a:ext uri="{FF2B5EF4-FFF2-40B4-BE49-F238E27FC236}">
+                <a16:creationId xmlns:a16="http://schemas.microsoft.com/office/drawing/2014/main" id="{D2C06415-075A-4BC2-8D49-9A5D4B0598AF}"/>
+              </a:ext>
+            </a:extLst>
+          </p:cNvPr>
+          <p:cNvPicPr>
+            <a:picLocks noChangeAspect="1"/>
+          </p:cNvPicPr>
+          <p:nvPr/>
+        </p:nvPicPr>
+        <p:blipFill>
+          <a:blip r:embed="rId3">
+            <a:extLst>
+              <a:ext uri="{28A0092B-C50C-407E-A947-70E740481C1C}">
+                <a14:useLocalDpi xmlns:a14="http://schemas.microsoft.com/office/drawing/2010/main" val="0"/>
+              </a:ext>
+            </a:extLst>
+          </a:blip>
+          <a:stretch>
+            <a:fillRect/>
+          </a:stretch>
+        </p:blipFill>
+        <p:spPr>
+          <a:xfrm>
+            <a:off x="1016467" y="1578178"/>
+            <a:ext cx="4572000" cy="4572000"/>
+          </a:xfrm>
+          <a:prstGeom prst="rect">
+            <a:avLst/>
+          </a:prstGeom>
+        </p:spPr>
+      </p:pic>
     </p:spTree>
     <p:extLst>
       <p:ext uri="{BB962C8B-B14F-4D97-AF65-F5344CB8AC3E}">
-        <p14:creationId xmlns:p14="http://schemas.microsoft.com/office/powerpoint/2010/main" val="2972234332"/>
+        <p14:creationId xmlns:p14="http://schemas.microsoft.com/office/powerpoint/2010/main" val="3978825970"/>
+      </p:ext>
+    </p:extLst>
+  </p:cSld>
+  <p:clrMapOvr>
+    <a:masterClrMapping/>
+  </p:clrMapOvr>
+</p:sld>
+</file>
+
+<file path=ppt/slides/slide8.xml><?xml version="1.0" encoding="utf-8"?>
+<p:sld xmlns:a="http://schemas.openxmlformats.org/drawingml/2006/main" xmlns:r="http://schemas.openxmlformats.org/officeDocument/2006/relationships" xmlns:p="http://schemas.openxmlformats.org/presentationml/2006/main">
+  <p:cSld>
+    <p:spTree>
+      <p:nvGrpSpPr>
+        <p:cNvPr id="1" name=""/>
+        <p:cNvGrpSpPr/>
+        <p:nvPr/>
+      </p:nvGrpSpPr>
+      <p:grpSpPr>
+        <a:xfrm>
+          <a:off x="0" y="0"/>
+          <a:ext cx="0" cy="0"/>
+          <a:chOff x="0" y="0"/>
+          <a:chExt cx="0" cy="0"/>
+        </a:xfrm>
+      </p:grpSpPr>
+      <p:sp>
+        <p:nvSpPr>
+          <p:cNvPr id="2" name="Title 1">
+            <a:extLst>
+              <a:ext uri="{FF2B5EF4-FFF2-40B4-BE49-F238E27FC236}">
+                <a16:creationId xmlns:a16="http://schemas.microsoft.com/office/drawing/2014/main" id="{273B825D-ED3F-44F6-AD37-E3B47C0102B2}"/>
+              </a:ext>
+            </a:extLst>
+          </p:cNvPr>
+          <p:cNvSpPr>
+            <a:spLocks noGrp="1"/>
+          </p:cNvSpPr>
+          <p:nvPr>
+            <p:ph type="title"/>
+          </p:nvPr>
+        </p:nvSpPr>
+        <p:spPr>
+          <a:xfrm>
+            <a:off x="838200" y="365126"/>
+            <a:ext cx="10515600" cy="926780"/>
+          </a:xfrm>
+        </p:spPr>
+        <p:txBody>
+          <a:bodyPr>
+            <a:normAutofit/>
+          </a:bodyPr>
+          <a:lstStyle/>
+          <a:p>
+            <a:r>
+              <a:rPr lang="en-GB" sz="1500" dirty="0"/>
+              <a:t>Projection strength of neurons, reordered by the allocations.</a:t>
+            </a:r>
+          </a:p>
+        </p:txBody>
+      </p:sp>
+      <p:pic>
+        <p:nvPicPr>
+          <p:cNvPr id="5" name="Content Placeholder 4">
+            <a:extLst>
+              <a:ext uri="{FF2B5EF4-FFF2-40B4-BE49-F238E27FC236}">
+                <a16:creationId xmlns:a16="http://schemas.microsoft.com/office/drawing/2014/main" id="{FEB170E3-0419-44B7-92CB-0891B6CCF834}"/>
+              </a:ext>
+            </a:extLst>
+          </p:cNvPr>
+          <p:cNvPicPr>
+            <a:picLocks noGrp="1" noChangeAspect="1"/>
+          </p:cNvPicPr>
+          <p:nvPr>
+            <p:ph idx="1"/>
+          </p:nvPr>
+        </p:nvPicPr>
+        <p:blipFill>
+          <a:blip r:embed="rId2">
+            <a:extLst>
+              <a:ext uri="{28A0092B-C50C-407E-A947-70E740481C1C}">
+                <a14:useLocalDpi xmlns:a14="http://schemas.microsoft.com/office/drawing/2010/main" val="0"/>
+              </a:ext>
+            </a:extLst>
+          </a:blip>
+          <a:stretch>
+            <a:fillRect/>
+          </a:stretch>
+        </p:blipFill>
+        <p:spPr>
+          <a:xfrm>
+            <a:off x="3444349" y="1063737"/>
+            <a:ext cx="5303302" cy="5303302"/>
+          </a:xfrm>
+        </p:spPr>
+      </p:pic>
+    </p:spTree>
+    <p:extLst>
+      <p:ext uri="{BB962C8B-B14F-4D97-AF65-F5344CB8AC3E}">
+        <p14:creationId xmlns:p14="http://schemas.microsoft.com/office/powerpoint/2010/main" val="418563897"/>
+      </p:ext>
+    </p:extLst>
+  </p:cSld>
+  <p:clrMapOvr>
+    <a:masterClrMapping/>
+  </p:clrMapOvr>
+</p:sld>
+</file>
+
+<file path=ppt/slides/slide9.xml><?xml version="1.0" encoding="utf-8"?>
+<p:sld xmlns:a="http://schemas.openxmlformats.org/drawingml/2006/main" xmlns:r="http://schemas.openxmlformats.org/officeDocument/2006/relationships" xmlns:p="http://schemas.openxmlformats.org/presentationml/2006/main">
+  <p:cSld>
+    <p:spTree>
+      <p:nvGrpSpPr>
+        <p:cNvPr id="1" name=""/>
+        <p:cNvGrpSpPr/>
+        <p:nvPr/>
+      </p:nvGrpSpPr>
+      <p:grpSpPr>
+        <a:xfrm>
+          <a:off x="0" y="0"/>
+          <a:ext cx="0" cy="0"/>
+          <a:chOff x="0" y="0"/>
+          <a:chExt cx="0" cy="0"/>
+        </a:xfrm>
+      </p:grpSpPr>
+      <p:sp>
+        <p:nvSpPr>
+          <p:cNvPr id="4" name="Content Placeholder 2">
+            <a:extLst>
+              <a:ext uri="{FF2B5EF4-FFF2-40B4-BE49-F238E27FC236}">
+                <a16:creationId xmlns:a16="http://schemas.microsoft.com/office/drawing/2014/main" id="{16956498-3B08-4EC6-B1FD-B38657847DE6}"/>
+              </a:ext>
+            </a:extLst>
+          </p:cNvPr>
+          <p:cNvSpPr>
+            <a:spLocks noGrp="1"/>
+          </p:cNvSpPr>
+          <p:nvPr>
+            <p:ph idx="1"/>
+          </p:nvPr>
+        </p:nvSpPr>
+        <p:spPr>
+          <a:xfrm>
+            <a:off x="838200" y="525332"/>
+            <a:ext cx="10515600" cy="724628"/>
+          </a:xfrm>
+        </p:spPr>
+        <p:txBody>
+          <a:bodyPr>
+            <a:normAutofit/>
+          </a:bodyPr>
+          <a:lstStyle/>
+          <a:p>
+            <a:pPr marL="0" indent="0">
+              <a:buNone/>
+            </a:pPr>
+            <a:r>
+              <a:rPr lang="en-GB" sz="1500" dirty="0"/>
+              <a:t>Distribution of the sum of counts across all brain regions for neurons within each cluster:</a:t>
+            </a:r>
+          </a:p>
+        </p:txBody>
+      </p:sp>
+      <p:pic>
+        <p:nvPicPr>
+          <p:cNvPr id="6" name="Picture 5">
+            <a:extLst>
+              <a:ext uri="{FF2B5EF4-FFF2-40B4-BE49-F238E27FC236}">
+                <a16:creationId xmlns:a16="http://schemas.microsoft.com/office/drawing/2014/main" id="{66D63720-3653-421D-B4C4-685BBC5ADCC0}"/>
+              </a:ext>
+            </a:extLst>
+          </p:cNvPr>
+          <p:cNvPicPr>
+            <a:picLocks noChangeAspect="1"/>
+          </p:cNvPicPr>
+          <p:nvPr/>
+        </p:nvPicPr>
+        <p:blipFill>
+          <a:blip r:embed="rId2">
+            <a:extLst>
+              <a:ext uri="{28A0092B-C50C-407E-A947-70E740481C1C}">
+                <a14:useLocalDpi xmlns:a14="http://schemas.microsoft.com/office/drawing/2010/main" val="0"/>
+              </a:ext>
+            </a:extLst>
+          </a:blip>
+          <a:stretch>
+            <a:fillRect/>
+          </a:stretch>
+        </p:blipFill>
+        <p:spPr>
+          <a:xfrm>
+            <a:off x="0" y="1234440"/>
+            <a:ext cx="12192000" cy="4389120"/>
+          </a:xfrm>
+          <a:prstGeom prst="rect">
+            <a:avLst/>
+          </a:prstGeom>
+        </p:spPr>
+      </p:pic>
+    </p:spTree>
+    <p:extLst>
+      <p:ext uri="{BB962C8B-B14F-4D97-AF65-F5344CB8AC3E}">
+        <p14:creationId xmlns:p14="http://schemas.microsoft.com/office/powerpoint/2010/main" val="1415361761"/>
       </p:ext>
     </p:extLst>
   </p:cSld>

</xml_diff>